<commit_message>
modified material and methods
</commit_message>
<xml_diff>
--- a/Defense/metaboPipe.pptx
+++ b/Defense/metaboPipe.pptx
@@ -17,11 +17,12 @@
     <p:sldId id="292" r:id="rId14"/>
     <p:sldId id="285" r:id="rId15"/>
     <p:sldId id="294" r:id="rId16"/>
-    <p:sldId id="286" r:id="rId17"/>
-    <p:sldId id="295" r:id="rId18"/>
-    <p:sldId id="287" r:id="rId19"/>
-    <p:sldId id="288" r:id="rId20"/>
-    <p:sldId id="272" r:id="rId21"/>
+    <p:sldId id="297" r:id="rId17"/>
+    <p:sldId id="300" r:id="rId18"/>
+    <p:sldId id="301" r:id="rId19"/>
+    <p:sldId id="287" r:id="rId20"/>
+    <p:sldId id="288" r:id="rId21"/>
+    <p:sldId id="272" r:id="rId22"/>
   </p:sldIdLst>
   <p:sldSz cx="12192000" cy="6858000"/>
   <p:notesSz cx="6858000" cy="9144000"/>
@@ -9663,7 +9664,7 @@
                 <a:latin typeface="Chakra Petch" panose="00000500000000000000" pitchFamily="2" charset="-34"/>
                 <a:cs typeface="Chakra Petch" panose="00000500000000000000" pitchFamily="2" charset="-34"/>
               </a:rPr>
-              <a:t>Materials and Methods</a:t>
+              <a:t>The Plan</a:t>
             </a:r>
           </a:p>
         </p:txBody>
@@ -9699,7 +9700,7 @@
         </p:blipFill>
         <p:spPr>
           <a:xfrm>
-            <a:off x="681075" y="2808916"/>
+            <a:off x="1416833" y="2552218"/>
             <a:ext cx="914400" cy="914400"/>
           </a:xfrm>
           <a:prstGeom prst="rect">
@@ -9738,7 +9739,7 @@
         </p:blipFill>
         <p:spPr>
           <a:xfrm>
-            <a:off x="687134" y="3704266"/>
+            <a:off x="1422892" y="3447568"/>
             <a:ext cx="914400" cy="914400"/>
           </a:xfrm>
           <a:prstGeom prst="rect">
@@ -9777,7 +9778,7 @@
         </p:blipFill>
         <p:spPr>
           <a:xfrm>
-            <a:off x="1601534" y="3704266"/>
+            <a:off x="2337292" y="3447568"/>
             <a:ext cx="914400" cy="914400"/>
           </a:xfrm>
           <a:prstGeom prst="rect">
@@ -9815,46 +9816,7 @@
         </p:blipFill>
         <p:spPr>
           <a:xfrm>
-            <a:off x="1595475" y="2808916"/>
-            <a:ext cx="914400" cy="914400"/>
-          </a:xfrm>
-          <a:prstGeom prst="rect">
-            <a:avLst/>
-          </a:prstGeom>
-        </p:spPr>
-      </p:pic>
-      <p:pic>
-        <p:nvPicPr>
-          <p:cNvPr id="12" name="Graphic 11" descr="Layers Design outline">
-            <a:extLst>
-              <a:ext uri="{FF2B5EF4-FFF2-40B4-BE49-F238E27FC236}">
-                <a16:creationId xmlns:a16="http://schemas.microsoft.com/office/drawing/2014/main" id="{8128282E-4B22-8AB1-5EF2-6BF1F1038010}"/>
-              </a:ext>
-            </a:extLst>
-          </p:cNvPr>
-          <p:cNvPicPr>
-            <a:picLocks noChangeAspect="1"/>
-          </p:cNvPicPr>
-          <p:nvPr/>
-        </p:nvPicPr>
-        <p:blipFill>
-          <a:blip r:embed="rId10">
-            <a:extLst>
-              <a:ext uri="{28A0092B-C50C-407E-A947-70E740481C1C}">
-                <a14:useLocalDpi xmlns:a14="http://schemas.microsoft.com/office/drawing/2010/main" val="0"/>
-              </a:ext>
-              <a:ext uri="{96DAC541-7B7A-43D3-8B79-37D633B846F1}">
-                <asvg:svgBlip xmlns:asvg="http://schemas.microsoft.com/office/drawing/2016/SVG/main" r:embed="rId11"/>
-              </a:ext>
-            </a:extLst>
-          </a:blip>
-          <a:stretch>
-            <a:fillRect/>
-          </a:stretch>
-        </p:blipFill>
-        <p:spPr>
-          <a:xfrm>
-            <a:off x="9325051" y="5563083"/>
+            <a:off x="2331233" y="2552218"/>
             <a:ext cx="914400" cy="914400"/>
           </a:xfrm>
           <a:prstGeom prst="rect">
@@ -9877,13 +9839,13 @@
           <p:nvPr/>
         </p:nvPicPr>
         <p:blipFill>
-          <a:blip r:embed="rId12">
+          <a:blip r:embed="rId10">
             <a:extLst>
               <a:ext uri="{28A0092B-C50C-407E-A947-70E740481C1C}">
                 <a14:useLocalDpi xmlns:a14="http://schemas.microsoft.com/office/drawing/2010/main" val="0"/>
               </a:ext>
               <a:ext uri="{96DAC541-7B7A-43D3-8B79-37D633B846F1}">
-                <asvg:svgBlip xmlns:asvg="http://schemas.microsoft.com/office/drawing/2016/SVG/main" r:embed="rId13"/>
+                <asvg:svgBlip xmlns:asvg="http://schemas.microsoft.com/office/drawing/2016/SVG/main" r:embed="rId11"/>
               </a:ext>
             </a:extLst>
           </a:blip>
@@ -9893,7 +9855,7 @@
         </p:blipFill>
         <p:spPr>
           <a:xfrm>
-            <a:off x="5815584" y="3285166"/>
+            <a:off x="6305523" y="2969400"/>
             <a:ext cx="914400" cy="914400"/>
           </a:xfrm>
           <a:prstGeom prst="rect">
@@ -9916,13 +9878,13 @@
           <p:nvPr/>
         </p:nvPicPr>
         <p:blipFill>
-          <a:blip r:embed="rId14">
+          <a:blip r:embed="rId12">
             <a:extLst>
               <a:ext uri="{28A0092B-C50C-407E-A947-70E740481C1C}">
                 <a14:useLocalDpi xmlns:a14="http://schemas.microsoft.com/office/drawing/2010/main" val="0"/>
               </a:ext>
               <a:ext uri="{96DAC541-7B7A-43D3-8B79-37D633B846F1}">
-                <asvg:svgBlip xmlns:asvg="http://schemas.microsoft.com/office/drawing/2016/SVG/main" r:embed="rId15"/>
+                <asvg:svgBlip xmlns:asvg="http://schemas.microsoft.com/office/drawing/2016/SVG/main" r:embed="rId13"/>
               </a:ext>
             </a:extLst>
           </a:blip>
@@ -9932,85 +9894,7 @@
         </p:blipFill>
         <p:spPr>
           <a:xfrm>
-            <a:off x="3366458" y="3285166"/>
-            <a:ext cx="914400" cy="914400"/>
-          </a:xfrm>
-          <a:prstGeom prst="rect">
-            <a:avLst/>
-          </a:prstGeom>
-        </p:spPr>
-      </p:pic>
-      <p:pic>
-        <p:nvPicPr>
-          <p:cNvPr id="18" name="Graphic 17" descr="Illustrator outline">
-            <a:extLst>
-              <a:ext uri="{FF2B5EF4-FFF2-40B4-BE49-F238E27FC236}">
-                <a16:creationId xmlns:a16="http://schemas.microsoft.com/office/drawing/2014/main" id="{AB7ED2FB-C643-18C6-C91B-04B8AFCA0360}"/>
-              </a:ext>
-            </a:extLst>
-          </p:cNvPr>
-          <p:cNvPicPr>
-            <a:picLocks noChangeAspect="1"/>
-          </p:cNvPicPr>
-          <p:nvPr/>
-        </p:nvPicPr>
-        <p:blipFill>
-          <a:blip r:embed="rId16">
-            <a:extLst>
-              <a:ext uri="{28A0092B-C50C-407E-A947-70E740481C1C}">
-                <a14:useLocalDpi xmlns:a14="http://schemas.microsoft.com/office/drawing/2010/main" val="0"/>
-              </a:ext>
-              <a:ext uri="{96DAC541-7B7A-43D3-8B79-37D633B846F1}">
-                <asvg:svgBlip xmlns:asvg="http://schemas.microsoft.com/office/drawing/2016/SVG/main" r:embed="rId17"/>
-              </a:ext>
-            </a:extLst>
-          </a:blip>
-          <a:stretch>
-            <a:fillRect/>
-          </a:stretch>
-        </p:blipFill>
-        <p:spPr>
-          <a:xfrm>
-            <a:off x="9277502" y="3293732"/>
-            <a:ext cx="914400" cy="914400"/>
-          </a:xfrm>
-          <a:prstGeom prst="rect">
-            <a:avLst/>
-          </a:prstGeom>
-        </p:spPr>
-      </p:pic>
-      <p:pic>
-        <p:nvPicPr>
-          <p:cNvPr id="20" name="Graphic 19" descr="Table outline">
-            <a:extLst>
-              <a:ext uri="{FF2B5EF4-FFF2-40B4-BE49-F238E27FC236}">
-                <a16:creationId xmlns:a16="http://schemas.microsoft.com/office/drawing/2014/main" id="{280EF6F1-8A1B-84AA-9D70-886AC2852591}"/>
-              </a:ext>
-            </a:extLst>
-          </p:cNvPr>
-          <p:cNvPicPr>
-            <a:picLocks noChangeAspect="1"/>
-          </p:cNvPicPr>
-          <p:nvPr/>
-        </p:nvPicPr>
-        <p:blipFill>
-          <a:blip r:embed="rId18">
-            <a:extLst>
-              <a:ext uri="{28A0092B-C50C-407E-A947-70E740481C1C}">
-                <a14:useLocalDpi xmlns:a14="http://schemas.microsoft.com/office/drawing/2010/main" val="0"/>
-              </a:ext>
-              <a:ext uri="{96DAC541-7B7A-43D3-8B79-37D633B846F1}">
-                <asvg:svgBlip xmlns:asvg="http://schemas.microsoft.com/office/drawing/2016/SVG/main" r:embed="rId19"/>
-              </a:ext>
-            </a:extLst>
-          </a:blip>
-          <a:stretch>
-            <a:fillRect/>
-          </a:stretch>
-        </p:blipFill>
-        <p:spPr>
-          <a:xfrm>
-            <a:off x="10744125" y="4590091"/>
+            <a:off x="4317106" y="2971800"/>
             <a:ext cx="914400" cy="914400"/>
           </a:xfrm>
           <a:prstGeom prst="rect">
@@ -10033,13 +9917,13 @@
           <p:nvPr/>
         </p:nvPicPr>
         <p:blipFill>
-          <a:blip r:embed="rId20">
+          <a:blip r:embed="rId14">
             <a:extLst>
               <a:ext uri="{28A0092B-C50C-407E-A947-70E740481C1C}">
                 <a14:useLocalDpi xmlns:a14="http://schemas.microsoft.com/office/drawing/2010/main" val="0"/>
               </a:ext>
               <a:ext uri="{96DAC541-7B7A-43D3-8B79-37D633B846F1}">
-                <asvg:svgBlip xmlns:asvg="http://schemas.microsoft.com/office/drawing/2016/SVG/main" r:embed="rId21"/>
+                <asvg:svgBlip xmlns:asvg="http://schemas.microsoft.com/office/drawing/2016/SVG/main" r:embed="rId15"/>
               </a:ext>
             </a:extLst>
           </a:blip>
@@ -10049,7 +9933,553 @@
         </p:blipFill>
         <p:spPr>
           <a:xfrm>
-            <a:off x="7129559" y="2370766"/>
+            <a:off x="7130123" y="2206542"/>
+            <a:ext cx="914400" cy="914400"/>
+          </a:xfrm>
+          <a:prstGeom prst="rect">
+            <a:avLst/>
+          </a:prstGeom>
+        </p:spPr>
+      </p:pic>
+      <p:pic>
+        <p:nvPicPr>
+          <p:cNvPr id="5" name="Graphic 4" descr="Acquisition with solid fill">
+            <a:extLst>
+              <a:ext uri="{FF2B5EF4-FFF2-40B4-BE49-F238E27FC236}">
+                <a16:creationId xmlns:a16="http://schemas.microsoft.com/office/drawing/2014/main" id="{3AA0AEE4-7C5F-1AE5-0541-972320F9CBEB}"/>
+              </a:ext>
+            </a:extLst>
+          </p:cNvPr>
+          <p:cNvPicPr>
+            <a:picLocks noChangeAspect="1"/>
+          </p:cNvPicPr>
+          <p:nvPr/>
+        </p:nvPicPr>
+        <p:blipFill>
+          <a:blip r:embed="rId16">
+            <a:extLst>
+              <a:ext uri="{28A0092B-C50C-407E-A947-70E740481C1C}">
+                <a14:useLocalDpi xmlns:a14="http://schemas.microsoft.com/office/drawing/2010/main" val="0"/>
+              </a:ext>
+              <a:ext uri="{96DAC541-7B7A-43D3-8B79-37D633B846F1}">
+                <asvg:svgBlip xmlns:asvg="http://schemas.microsoft.com/office/drawing/2016/SVG/main" r:embed="rId17"/>
+              </a:ext>
+            </a:extLst>
+          </a:blip>
+          <a:stretch>
+            <a:fillRect/>
+          </a:stretch>
+        </p:blipFill>
+        <p:spPr>
+          <a:xfrm flipV="1">
+            <a:off x="7206162" y="2901147"/>
+            <a:ext cx="914400" cy="914400"/>
+          </a:xfrm>
+          <a:prstGeom prst="rect">
+            <a:avLst/>
+          </a:prstGeom>
+        </p:spPr>
+      </p:pic>
+      <p:pic>
+        <p:nvPicPr>
+          <p:cNvPr id="9" name="Graphic 8" descr="Arrow Right with solid fill">
+            <a:extLst>
+              <a:ext uri="{FF2B5EF4-FFF2-40B4-BE49-F238E27FC236}">
+                <a16:creationId xmlns:a16="http://schemas.microsoft.com/office/drawing/2014/main" id="{447AA9CC-5D1B-9AE1-6486-2A65075C5B48}"/>
+              </a:ext>
+            </a:extLst>
+          </p:cNvPr>
+          <p:cNvPicPr>
+            <a:picLocks noChangeAspect="1"/>
+          </p:cNvPicPr>
+          <p:nvPr/>
+        </p:nvPicPr>
+        <p:blipFill>
+          <a:blip r:embed="rId18">
+            <a:extLst>
+              <a:ext uri="{28A0092B-C50C-407E-A947-70E740481C1C}">
+                <a14:useLocalDpi xmlns:a14="http://schemas.microsoft.com/office/drawing/2010/main" val="0"/>
+              </a:ext>
+              <a:ext uri="{96DAC541-7B7A-43D3-8B79-37D633B846F1}">
+                <asvg:svgBlip xmlns:asvg="http://schemas.microsoft.com/office/drawing/2016/SVG/main" r:embed="rId19"/>
+              </a:ext>
+            </a:extLst>
+          </a:blip>
+          <a:stretch>
+            <a:fillRect/>
+          </a:stretch>
+        </p:blipFill>
+        <p:spPr>
+          <a:xfrm>
+            <a:off x="8924667" y="2969400"/>
+            <a:ext cx="914400" cy="914400"/>
+          </a:xfrm>
+          <a:prstGeom prst="rect">
+            <a:avLst/>
+          </a:prstGeom>
+        </p:spPr>
+      </p:pic>
+      <p:pic>
+        <p:nvPicPr>
+          <p:cNvPr id="13" name="Graphic 12" descr="Line arrow: Rotate right with solid fill">
+            <a:extLst>
+              <a:ext uri="{FF2B5EF4-FFF2-40B4-BE49-F238E27FC236}">
+                <a16:creationId xmlns:a16="http://schemas.microsoft.com/office/drawing/2014/main" id="{44804FB3-E78C-F1A7-5330-AC1883D473E0}"/>
+              </a:ext>
+            </a:extLst>
+          </p:cNvPr>
+          <p:cNvPicPr>
+            <a:picLocks noChangeAspect="1"/>
+          </p:cNvPicPr>
+          <p:nvPr/>
+        </p:nvPicPr>
+        <p:blipFill>
+          <a:blip r:embed="rId20">
+            <a:extLst>
+              <a:ext uri="{28A0092B-C50C-407E-A947-70E740481C1C}">
+                <a14:useLocalDpi xmlns:a14="http://schemas.microsoft.com/office/drawing/2010/main" val="0"/>
+              </a:ext>
+              <a:ext uri="{96DAC541-7B7A-43D3-8B79-37D633B846F1}">
+                <asvg:svgBlip xmlns:asvg="http://schemas.microsoft.com/office/drawing/2016/SVG/main" r:embed="rId21"/>
+              </a:ext>
+            </a:extLst>
+          </a:blip>
+          <a:stretch>
+            <a:fillRect/>
+          </a:stretch>
+        </p:blipFill>
+        <p:spPr>
+          <a:xfrm rot="13302510">
+            <a:off x="7345764" y="3522836"/>
+            <a:ext cx="914400" cy="914400"/>
+          </a:xfrm>
+          <a:prstGeom prst="rect">
+            <a:avLst/>
+          </a:prstGeom>
+        </p:spPr>
+      </p:pic>
+      <p:pic>
+        <p:nvPicPr>
+          <p:cNvPr id="26" name="Graphic 25" descr="Workflow with solid fill">
+            <a:extLst>
+              <a:ext uri="{FF2B5EF4-FFF2-40B4-BE49-F238E27FC236}">
+                <a16:creationId xmlns:a16="http://schemas.microsoft.com/office/drawing/2014/main" id="{04314610-BCC9-2DD4-0413-0FA5102FF3B5}"/>
+              </a:ext>
+            </a:extLst>
+          </p:cNvPr>
+          <p:cNvPicPr>
+            <a:picLocks noChangeAspect="1"/>
+          </p:cNvPicPr>
+          <p:nvPr/>
+        </p:nvPicPr>
+        <p:blipFill>
+          <a:blip r:embed="rId22">
+            <a:extLst>
+              <a:ext uri="{28A0092B-C50C-407E-A947-70E740481C1C}">
+                <a14:useLocalDpi xmlns:a14="http://schemas.microsoft.com/office/drawing/2010/main" val="0"/>
+              </a:ext>
+              <a:ext uri="{96DAC541-7B7A-43D3-8B79-37D633B846F1}">
+                <asvg:svgBlip xmlns:asvg="http://schemas.microsoft.com/office/drawing/2016/SVG/main" r:embed="rId23"/>
+              </a:ext>
+            </a:extLst>
+          </a:blip>
+          <a:stretch>
+            <a:fillRect/>
+          </a:stretch>
+        </p:blipFill>
+        <p:spPr>
+          <a:xfrm>
+            <a:off x="9858058" y="2969400"/>
+            <a:ext cx="914400" cy="914400"/>
+          </a:xfrm>
+          <a:prstGeom prst="rect">
+            <a:avLst/>
+          </a:prstGeom>
+        </p:spPr>
+      </p:pic>
+      <p:pic>
+        <p:nvPicPr>
+          <p:cNvPr id="27" name="Graphic 26" descr="Arrow Right with solid fill">
+            <a:extLst>
+              <a:ext uri="{FF2B5EF4-FFF2-40B4-BE49-F238E27FC236}">
+                <a16:creationId xmlns:a16="http://schemas.microsoft.com/office/drawing/2014/main" id="{7E3232CE-E992-70D1-FD3C-2EDBA42304AD}"/>
+              </a:ext>
+            </a:extLst>
+          </p:cNvPr>
+          <p:cNvPicPr>
+            <a:picLocks noChangeAspect="1"/>
+          </p:cNvPicPr>
+          <p:nvPr/>
+        </p:nvPicPr>
+        <p:blipFill>
+          <a:blip r:embed="rId18">
+            <a:extLst>
+              <a:ext uri="{28A0092B-C50C-407E-A947-70E740481C1C}">
+                <a14:useLocalDpi xmlns:a14="http://schemas.microsoft.com/office/drawing/2010/main" val="0"/>
+              </a:ext>
+              <a:ext uri="{96DAC541-7B7A-43D3-8B79-37D633B846F1}">
+                <asvg:svgBlip xmlns:asvg="http://schemas.microsoft.com/office/drawing/2016/SVG/main" r:embed="rId19"/>
+              </a:ext>
+            </a:extLst>
+          </a:blip>
+          <a:stretch>
+            <a:fillRect/>
+          </a:stretch>
+        </p:blipFill>
+        <p:spPr>
+          <a:xfrm>
+            <a:off x="5309661" y="2969400"/>
+            <a:ext cx="914400" cy="914400"/>
+          </a:xfrm>
+          <a:prstGeom prst="rect">
+            <a:avLst/>
+          </a:prstGeom>
+        </p:spPr>
+      </p:pic>
+      <p:pic>
+        <p:nvPicPr>
+          <p:cNvPr id="29" name="Graphic 28" descr="Scatterplot with solid fill">
+            <a:extLst>
+              <a:ext uri="{FF2B5EF4-FFF2-40B4-BE49-F238E27FC236}">
+                <a16:creationId xmlns:a16="http://schemas.microsoft.com/office/drawing/2014/main" id="{C2048285-7293-48E1-E144-EB95E952F3E6}"/>
+              </a:ext>
+            </a:extLst>
+          </p:cNvPr>
+          <p:cNvPicPr>
+            <a:picLocks noChangeAspect="1"/>
+          </p:cNvPicPr>
+          <p:nvPr/>
+        </p:nvPicPr>
+        <p:blipFill>
+          <a:blip r:embed="rId24">
+            <a:extLst>
+              <a:ext uri="{28A0092B-C50C-407E-A947-70E740481C1C}">
+                <a14:useLocalDpi xmlns:a14="http://schemas.microsoft.com/office/drawing/2010/main" val="0"/>
+              </a:ext>
+              <a:ext uri="{96DAC541-7B7A-43D3-8B79-37D633B846F1}">
+                <asvg:svgBlip xmlns:asvg="http://schemas.microsoft.com/office/drawing/2016/SVG/main" r:embed="rId25"/>
+              </a:ext>
+            </a:extLst>
+          </a:blip>
+          <a:stretch>
+            <a:fillRect/>
+          </a:stretch>
+        </p:blipFill>
+        <p:spPr>
+          <a:xfrm>
+            <a:off x="8036185" y="2969400"/>
+            <a:ext cx="914400" cy="914400"/>
+          </a:xfrm>
+          <a:prstGeom prst="rect">
+            <a:avLst/>
+          </a:prstGeom>
+        </p:spPr>
+      </p:pic>
+      <p:pic>
+        <p:nvPicPr>
+          <p:cNvPr id="31" name="Graphic 30" descr="Arrow Right with solid fill">
+            <a:extLst>
+              <a:ext uri="{FF2B5EF4-FFF2-40B4-BE49-F238E27FC236}">
+                <a16:creationId xmlns:a16="http://schemas.microsoft.com/office/drawing/2014/main" id="{556F1497-DC9A-FCB0-6D57-EADCC586CD7D}"/>
+              </a:ext>
+            </a:extLst>
+          </p:cNvPr>
+          <p:cNvPicPr>
+            <a:picLocks noChangeAspect="1"/>
+          </p:cNvPicPr>
+          <p:nvPr/>
+        </p:nvPicPr>
+        <p:blipFill>
+          <a:blip r:embed="rId18">
+            <a:extLst>
+              <a:ext uri="{28A0092B-C50C-407E-A947-70E740481C1C}">
+                <a14:useLocalDpi xmlns:a14="http://schemas.microsoft.com/office/drawing/2010/main" val="0"/>
+              </a:ext>
+              <a:ext uri="{96DAC541-7B7A-43D3-8B79-37D633B846F1}">
+                <asvg:svgBlip xmlns:asvg="http://schemas.microsoft.com/office/drawing/2016/SVG/main" r:embed="rId19"/>
+              </a:ext>
+            </a:extLst>
+          </a:blip>
+          <a:stretch>
+            <a:fillRect/>
+          </a:stretch>
+        </p:blipFill>
+        <p:spPr>
+          <a:xfrm>
+            <a:off x="3327095" y="2971800"/>
+            <a:ext cx="914400" cy="914400"/>
+          </a:xfrm>
+          <a:prstGeom prst="rect">
+            <a:avLst/>
+          </a:prstGeom>
+        </p:spPr>
+      </p:pic>
+      <p:pic>
+        <p:nvPicPr>
+          <p:cNvPr id="3" name="Graphic 2" descr="Layers Design outline">
+            <a:extLst>
+              <a:ext uri="{FF2B5EF4-FFF2-40B4-BE49-F238E27FC236}">
+                <a16:creationId xmlns:a16="http://schemas.microsoft.com/office/drawing/2014/main" id="{FD490D8D-4512-36E0-1CAE-C16B359EBE67}"/>
+              </a:ext>
+            </a:extLst>
+          </p:cNvPr>
+          <p:cNvPicPr>
+            <a:picLocks noChangeAspect="1"/>
+          </p:cNvPicPr>
+          <p:nvPr/>
+        </p:nvPicPr>
+        <p:blipFill>
+          <a:blip r:embed="rId26">
+            <a:extLst>
+              <a:ext uri="{28A0092B-C50C-407E-A947-70E740481C1C}">
+                <a14:useLocalDpi xmlns:a14="http://schemas.microsoft.com/office/drawing/2010/main" val="0"/>
+              </a:ext>
+              <a:ext uri="{96DAC541-7B7A-43D3-8B79-37D633B846F1}">
+                <asvg:svgBlip xmlns:asvg="http://schemas.microsoft.com/office/drawing/2016/SVG/main" r:embed="rId27"/>
+              </a:ext>
+            </a:extLst>
+          </a:blip>
+          <a:stretch>
+            <a:fillRect/>
+          </a:stretch>
+        </p:blipFill>
+        <p:spPr>
+          <a:xfrm>
+            <a:off x="8213311" y="5776295"/>
+            <a:ext cx="914400" cy="914400"/>
+          </a:xfrm>
+          <a:prstGeom prst="rect">
+            <a:avLst/>
+          </a:prstGeom>
+        </p:spPr>
+      </p:pic>
+      <p:pic>
+        <p:nvPicPr>
+          <p:cNvPr id="7" name="Graphic 6" descr="Illustrator outline">
+            <a:extLst>
+              <a:ext uri="{FF2B5EF4-FFF2-40B4-BE49-F238E27FC236}">
+                <a16:creationId xmlns:a16="http://schemas.microsoft.com/office/drawing/2014/main" id="{1C08C13A-3809-8254-4BEA-491970B19B47}"/>
+              </a:ext>
+            </a:extLst>
+          </p:cNvPr>
+          <p:cNvPicPr>
+            <a:picLocks noChangeAspect="1"/>
+          </p:cNvPicPr>
+          <p:nvPr/>
+        </p:nvPicPr>
+        <p:blipFill>
+          <a:blip r:embed="rId28">
+            <a:extLst>
+              <a:ext uri="{28A0092B-C50C-407E-A947-70E740481C1C}">
+                <a14:useLocalDpi xmlns:a14="http://schemas.microsoft.com/office/drawing/2010/main" val="0"/>
+              </a:ext>
+              <a:ext uri="{96DAC541-7B7A-43D3-8B79-37D633B846F1}">
+                <asvg:svgBlip xmlns:asvg="http://schemas.microsoft.com/office/drawing/2016/SVG/main" r:embed="rId29"/>
+              </a:ext>
+            </a:extLst>
+          </a:blip>
+          <a:stretch>
+            <a:fillRect/>
+          </a:stretch>
+        </p:blipFill>
+        <p:spPr>
+          <a:xfrm>
+            <a:off x="2244255" y="5669293"/>
+            <a:ext cx="914400" cy="914400"/>
+          </a:xfrm>
+          <a:prstGeom prst="rect">
+            <a:avLst/>
+          </a:prstGeom>
+        </p:spPr>
+      </p:pic>
+      <p:pic>
+        <p:nvPicPr>
+          <p:cNvPr id="11" name="Graphic 10" descr="Table outline">
+            <a:extLst>
+              <a:ext uri="{FF2B5EF4-FFF2-40B4-BE49-F238E27FC236}">
+                <a16:creationId xmlns:a16="http://schemas.microsoft.com/office/drawing/2014/main" id="{6BC91D82-ADE8-0117-5244-D68F2F07D07A}"/>
+              </a:ext>
+            </a:extLst>
+          </p:cNvPr>
+          <p:cNvPicPr>
+            <a:picLocks noChangeAspect="1"/>
+          </p:cNvPicPr>
+          <p:nvPr/>
+        </p:nvPicPr>
+        <p:blipFill>
+          <a:blip r:embed="rId30">
+            <a:extLst>
+              <a:ext uri="{28A0092B-C50C-407E-A947-70E740481C1C}">
+                <a14:useLocalDpi xmlns:a14="http://schemas.microsoft.com/office/drawing/2010/main" val="0"/>
+              </a:ext>
+              <a:ext uri="{96DAC541-7B7A-43D3-8B79-37D633B846F1}">
+                <asvg:svgBlip xmlns:asvg="http://schemas.microsoft.com/office/drawing/2016/SVG/main" r:embed="rId31"/>
+              </a:ext>
+            </a:extLst>
+          </a:blip>
+          <a:stretch>
+            <a:fillRect/>
+          </a:stretch>
+        </p:blipFill>
+        <p:spPr>
+          <a:xfrm>
+            <a:off x="10839375" y="5212093"/>
+            <a:ext cx="914400" cy="914400"/>
+          </a:xfrm>
+          <a:prstGeom prst="rect">
+            <a:avLst/>
+          </a:prstGeom>
+        </p:spPr>
+      </p:pic>
+      <p:pic>
+        <p:nvPicPr>
+          <p:cNvPr id="15" name="Graphic 14" descr="Line arrow: Slight curve with solid fill">
+            <a:extLst>
+              <a:ext uri="{FF2B5EF4-FFF2-40B4-BE49-F238E27FC236}">
+                <a16:creationId xmlns:a16="http://schemas.microsoft.com/office/drawing/2014/main" id="{9EE45F9E-1B34-2306-0BDA-9112318A041A}"/>
+              </a:ext>
+            </a:extLst>
+          </p:cNvPr>
+          <p:cNvPicPr>
+            <a:picLocks noChangeAspect="1"/>
+          </p:cNvPicPr>
+          <p:nvPr/>
+        </p:nvPicPr>
+        <p:blipFill>
+          <a:blip r:embed="rId32">
+            <a:extLst>
+              <a:ext uri="{28A0092B-C50C-407E-A947-70E740481C1C}">
+                <a14:useLocalDpi xmlns:a14="http://schemas.microsoft.com/office/drawing/2010/main" val="0"/>
+              </a:ext>
+              <a:ext uri="{96DAC541-7B7A-43D3-8B79-37D633B846F1}">
+                <asvg:svgBlip xmlns:asvg="http://schemas.microsoft.com/office/drawing/2016/SVG/main" r:embed="rId33"/>
+              </a:ext>
+            </a:extLst>
+          </a:blip>
+          <a:stretch>
+            <a:fillRect/>
+          </a:stretch>
+        </p:blipFill>
+        <p:spPr>
+          <a:xfrm>
+            <a:off x="3616648" y="5776295"/>
+            <a:ext cx="914400" cy="914400"/>
+          </a:xfrm>
+          <a:prstGeom prst="rect">
+            <a:avLst/>
+          </a:prstGeom>
+        </p:spPr>
+      </p:pic>
+      <p:pic>
+        <p:nvPicPr>
+          <p:cNvPr id="19" name="Graphic 18" descr="Line arrow: Horizontal U-turn with solid fill">
+            <a:extLst>
+              <a:ext uri="{FF2B5EF4-FFF2-40B4-BE49-F238E27FC236}">
+                <a16:creationId xmlns:a16="http://schemas.microsoft.com/office/drawing/2014/main" id="{62D7EDB6-1932-44BA-40E8-C60BEA52EFBA}"/>
+              </a:ext>
+            </a:extLst>
+          </p:cNvPr>
+          <p:cNvPicPr>
+            <a:picLocks noChangeAspect="1"/>
+          </p:cNvPicPr>
+          <p:nvPr/>
+        </p:nvPicPr>
+        <p:blipFill>
+          <a:blip r:embed="rId34">
+            <a:extLst>
+              <a:ext uri="{28A0092B-C50C-407E-A947-70E740481C1C}">
+                <a14:useLocalDpi xmlns:a14="http://schemas.microsoft.com/office/drawing/2010/main" val="0"/>
+              </a:ext>
+              <a:ext uri="{96DAC541-7B7A-43D3-8B79-37D633B846F1}">
+                <asvg:svgBlip xmlns:asvg="http://schemas.microsoft.com/office/drawing/2016/SVG/main" r:embed="rId35"/>
+              </a:ext>
+            </a:extLst>
+          </a:blip>
+          <a:stretch>
+            <a:fillRect/>
+          </a:stretch>
+        </p:blipFill>
+        <p:spPr>
+          <a:xfrm>
+            <a:off x="6746839" y="5685385"/>
+            <a:ext cx="914400" cy="914400"/>
+          </a:xfrm>
+          <a:prstGeom prst="rect">
+            <a:avLst/>
+          </a:prstGeom>
+        </p:spPr>
+      </p:pic>
+      <p:pic>
+        <p:nvPicPr>
+          <p:cNvPr id="23" name="Graphic 22" descr="Maze with solid fill">
+            <a:extLst>
+              <a:ext uri="{FF2B5EF4-FFF2-40B4-BE49-F238E27FC236}">
+                <a16:creationId xmlns:a16="http://schemas.microsoft.com/office/drawing/2014/main" id="{4FD70DDF-B9B7-E73B-EC4A-48206CFFCCEE}"/>
+              </a:ext>
+            </a:extLst>
+          </p:cNvPr>
+          <p:cNvPicPr>
+            <a:picLocks noChangeAspect="1"/>
+          </p:cNvPicPr>
+          <p:nvPr/>
+        </p:nvPicPr>
+        <p:blipFill>
+          <a:blip r:embed="rId36">
+            <a:extLst>
+              <a:ext uri="{28A0092B-C50C-407E-A947-70E740481C1C}">
+                <a14:useLocalDpi xmlns:a14="http://schemas.microsoft.com/office/drawing/2010/main" val="0"/>
+              </a:ext>
+              <a:ext uri="{96DAC541-7B7A-43D3-8B79-37D633B846F1}">
+                <asvg:svgBlip xmlns:asvg="http://schemas.microsoft.com/office/drawing/2016/SVG/main" r:embed="rId37"/>
+              </a:ext>
+            </a:extLst>
+          </a:blip>
+          <a:stretch>
+            <a:fillRect/>
+          </a:stretch>
+        </p:blipFill>
+        <p:spPr>
+          <a:xfrm>
+            <a:off x="9491625" y="5669293"/>
+            <a:ext cx="914400" cy="914400"/>
+          </a:xfrm>
+          <a:prstGeom prst="rect">
+            <a:avLst/>
+          </a:prstGeom>
+        </p:spPr>
+      </p:pic>
+      <p:pic>
+        <p:nvPicPr>
+          <p:cNvPr id="25" name="Graphic 24" descr="Arrow Right with solid fill">
+            <a:extLst>
+              <a:ext uri="{FF2B5EF4-FFF2-40B4-BE49-F238E27FC236}">
+                <a16:creationId xmlns:a16="http://schemas.microsoft.com/office/drawing/2014/main" id="{9393547B-84B7-AD6D-0F48-0B182CEF7EE4}"/>
+              </a:ext>
+            </a:extLst>
+          </p:cNvPr>
+          <p:cNvPicPr>
+            <a:picLocks noChangeAspect="1"/>
+          </p:cNvPicPr>
+          <p:nvPr/>
+        </p:nvPicPr>
+        <p:blipFill>
+          <a:blip r:embed="rId18">
+            <a:extLst>
+              <a:ext uri="{28A0092B-C50C-407E-A947-70E740481C1C}">
+                <a14:useLocalDpi xmlns:a14="http://schemas.microsoft.com/office/drawing/2010/main" val="0"/>
+              </a:ext>
+              <a:ext uri="{96DAC541-7B7A-43D3-8B79-37D633B846F1}">
+                <asvg:svgBlip xmlns:asvg="http://schemas.microsoft.com/office/drawing/2016/SVG/main" r:embed="rId19"/>
+              </a:ext>
+            </a:extLst>
+          </a:blip>
+          <a:stretch>
+            <a:fillRect/>
+          </a:stretch>
+        </p:blipFill>
+        <p:spPr>
+          <a:xfrm flipH="1">
+            <a:off x="5158564" y="5776295"/>
             <a:ext cx="914400" cy="914400"/>
           </a:xfrm>
           <a:prstGeom prst="rect">
@@ -10060,7 +10490,7 @@
     </p:spTree>
     <p:extLst>
       <p:ext uri="{BB962C8B-B14F-4D97-AF65-F5344CB8AC3E}">
-        <p14:creationId xmlns:p14="http://schemas.microsoft.com/office/powerpoint/2010/main" val="908900515"/>
+        <p14:creationId xmlns:p14="http://schemas.microsoft.com/office/powerpoint/2010/main" val="627326466"/>
       </p:ext>
     </p:extLst>
   </p:cSld>
@@ -10079,6 +10509,697 @@
       </p:transition>
     </mc:Fallback>
   </mc:AlternateContent>
+  <p:timing>
+    <p:tnLst>
+      <p:par>
+        <p:cTn id="1" dur="indefinite" restart="never" nodeType="tmRoot">
+          <p:childTnLst>
+            <p:seq concurrent="1" nextAc="seek">
+              <p:cTn id="2" dur="indefinite" nodeType="mainSeq">
+                <p:childTnLst>
+                  <p:par>
+                    <p:cTn id="3" fill="hold">
+                      <p:stCondLst>
+                        <p:cond delay="indefinite"/>
+                      </p:stCondLst>
+                      <p:childTnLst>
+                        <p:par>
+                          <p:cTn id="4" fill="hold">
+                            <p:stCondLst>
+                              <p:cond delay="0"/>
+                            </p:stCondLst>
+                            <p:childTnLst>
+                              <p:par>
+                                <p:cTn id="5" presetID="10" presetClass="entr" presetSubtype="0" fill="hold" nodeType="clickEffect">
+                                  <p:stCondLst>
+                                    <p:cond delay="0"/>
+                                  </p:stCondLst>
+                                  <p:childTnLst>
+                                    <p:set>
+                                      <p:cBhvr>
+                                        <p:cTn id="6" dur="1" fill="hold">
+                                          <p:stCondLst>
+                                            <p:cond delay="0"/>
+                                          </p:stCondLst>
+                                        </p:cTn>
+                                        <p:tgtEl>
+                                          <p:spTgt spid="4"/>
+                                        </p:tgtEl>
+                                        <p:attrNameLst>
+                                          <p:attrName>style.visibility</p:attrName>
+                                        </p:attrNameLst>
+                                      </p:cBhvr>
+                                      <p:to>
+                                        <p:strVal val="visible"/>
+                                      </p:to>
+                                    </p:set>
+                                    <p:animEffect transition="in" filter="fade">
+                                      <p:cBhvr>
+                                        <p:cTn id="7" dur="500"/>
+                                        <p:tgtEl>
+                                          <p:spTgt spid="4"/>
+                                        </p:tgtEl>
+                                      </p:cBhvr>
+                                    </p:animEffect>
+                                  </p:childTnLst>
+                                </p:cTn>
+                              </p:par>
+                              <p:par>
+                                <p:cTn id="8" presetID="10" presetClass="entr" presetSubtype="0" fill="hold" nodeType="withEffect">
+                                  <p:stCondLst>
+                                    <p:cond delay="0"/>
+                                  </p:stCondLst>
+                                  <p:childTnLst>
+                                    <p:set>
+                                      <p:cBhvr>
+                                        <p:cTn id="9" dur="1" fill="hold">
+                                          <p:stCondLst>
+                                            <p:cond delay="0"/>
+                                          </p:stCondLst>
+                                        </p:cTn>
+                                        <p:tgtEl>
+                                          <p:spTgt spid="6"/>
+                                        </p:tgtEl>
+                                        <p:attrNameLst>
+                                          <p:attrName>style.visibility</p:attrName>
+                                        </p:attrNameLst>
+                                      </p:cBhvr>
+                                      <p:to>
+                                        <p:strVal val="visible"/>
+                                      </p:to>
+                                    </p:set>
+                                    <p:animEffect transition="in" filter="fade">
+                                      <p:cBhvr>
+                                        <p:cTn id="10" dur="500"/>
+                                        <p:tgtEl>
+                                          <p:spTgt spid="6"/>
+                                        </p:tgtEl>
+                                      </p:cBhvr>
+                                    </p:animEffect>
+                                  </p:childTnLst>
+                                </p:cTn>
+                              </p:par>
+                              <p:par>
+                                <p:cTn id="11" presetID="10" presetClass="entr" presetSubtype="0" fill="hold" nodeType="withEffect">
+                                  <p:stCondLst>
+                                    <p:cond delay="0"/>
+                                  </p:stCondLst>
+                                  <p:childTnLst>
+                                    <p:set>
+                                      <p:cBhvr>
+                                        <p:cTn id="12" dur="1" fill="hold">
+                                          <p:stCondLst>
+                                            <p:cond delay="0"/>
+                                          </p:stCondLst>
+                                        </p:cTn>
+                                        <p:tgtEl>
+                                          <p:spTgt spid="8"/>
+                                        </p:tgtEl>
+                                        <p:attrNameLst>
+                                          <p:attrName>style.visibility</p:attrName>
+                                        </p:attrNameLst>
+                                      </p:cBhvr>
+                                      <p:to>
+                                        <p:strVal val="visible"/>
+                                      </p:to>
+                                    </p:set>
+                                    <p:animEffect transition="in" filter="fade">
+                                      <p:cBhvr>
+                                        <p:cTn id="13" dur="500"/>
+                                        <p:tgtEl>
+                                          <p:spTgt spid="8"/>
+                                        </p:tgtEl>
+                                      </p:cBhvr>
+                                    </p:animEffect>
+                                  </p:childTnLst>
+                                </p:cTn>
+                              </p:par>
+                              <p:par>
+                                <p:cTn id="14" presetID="10" presetClass="entr" presetSubtype="0" fill="hold" nodeType="withEffect">
+                                  <p:stCondLst>
+                                    <p:cond delay="0"/>
+                                  </p:stCondLst>
+                                  <p:childTnLst>
+                                    <p:set>
+                                      <p:cBhvr>
+                                        <p:cTn id="15" dur="1" fill="hold">
+                                          <p:stCondLst>
+                                            <p:cond delay="0"/>
+                                          </p:stCondLst>
+                                        </p:cTn>
+                                        <p:tgtEl>
+                                          <p:spTgt spid="10"/>
+                                        </p:tgtEl>
+                                        <p:attrNameLst>
+                                          <p:attrName>style.visibility</p:attrName>
+                                        </p:attrNameLst>
+                                      </p:cBhvr>
+                                      <p:to>
+                                        <p:strVal val="visible"/>
+                                      </p:to>
+                                    </p:set>
+                                    <p:animEffect transition="in" filter="fade">
+                                      <p:cBhvr>
+                                        <p:cTn id="16" dur="500"/>
+                                        <p:tgtEl>
+                                          <p:spTgt spid="10"/>
+                                        </p:tgtEl>
+                                      </p:cBhvr>
+                                    </p:animEffect>
+                                  </p:childTnLst>
+                                </p:cTn>
+                              </p:par>
+                            </p:childTnLst>
+                          </p:cTn>
+                        </p:par>
+                      </p:childTnLst>
+                    </p:cTn>
+                  </p:par>
+                  <p:par>
+                    <p:cTn id="17" fill="hold">
+                      <p:stCondLst>
+                        <p:cond delay="indefinite"/>
+                      </p:stCondLst>
+                      <p:childTnLst>
+                        <p:par>
+                          <p:cTn id="18" fill="hold">
+                            <p:stCondLst>
+                              <p:cond delay="0"/>
+                            </p:stCondLst>
+                            <p:childTnLst>
+                              <p:par>
+                                <p:cTn id="19" presetID="22" presetClass="entr" presetSubtype="8" fill="hold" nodeType="clickEffect">
+                                  <p:stCondLst>
+                                    <p:cond delay="0"/>
+                                  </p:stCondLst>
+                                  <p:childTnLst>
+                                    <p:set>
+                                      <p:cBhvr>
+                                        <p:cTn id="20" dur="1" fill="hold">
+                                          <p:stCondLst>
+                                            <p:cond delay="0"/>
+                                          </p:stCondLst>
+                                        </p:cTn>
+                                        <p:tgtEl>
+                                          <p:spTgt spid="31"/>
+                                        </p:tgtEl>
+                                        <p:attrNameLst>
+                                          <p:attrName>style.visibility</p:attrName>
+                                        </p:attrNameLst>
+                                      </p:cBhvr>
+                                      <p:to>
+                                        <p:strVal val="visible"/>
+                                      </p:to>
+                                    </p:set>
+                                    <p:animEffect transition="in" filter="wipe(left)">
+                                      <p:cBhvr>
+                                        <p:cTn id="21" dur="250"/>
+                                        <p:tgtEl>
+                                          <p:spTgt spid="31"/>
+                                        </p:tgtEl>
+                                      </p:cBhvr>
+                                    </p:animEffect>
+                                  </p:childTnLst>
+                                </p:cTn>
+                              </p:par>
+                            </p:childTnLst>
+                          </p:cTn>
+                        </p:par>
+                        <p:par>
+                          <p:cTn id="22" fill="hold">
+                            <p:stCondLst>
+                              <p:cond delay="250"/>
+                            </p:stCondLst>
+                            <p:childTnLst>
+                              <p:par>
+                                <p:cTn id="23" presetID="10" presetClass="entr" presetSubtype="0" fill="hold" nodeType="afterEffect">
+                                  <p:stCondLst>
+                                    <p:cond delay="0"/>
+                                  </p:stCondLst>
+                                  <p:childTnLst>
+                                    <p:set>
+                                      <p:cBhvr>
+                                        <p:cTn id="24" dur="1" fill="hold">
+                                          <p:stCondLst>
+                                            <p:cond delay="0"/>
+                                          </p:stCondLst>
+                                        </p:cTn>
+                                        <p:tgtEl>
+                                          <p:spTgt spid="16"/>
+                                        </p:tgtEl>
+                                        <p:attrNameLst>
+                                          <p:attrName>style.visibility</p:attrName>
+                                        </p:attrNameLst>
+                                      </p:cBhvr>
+                                      <p:to>
+                                        <p:strVal val="visible"/>
+                                      </p:to>
+                                    </p:set>
+                                    <p:animEffect transition="in" filter="fade">
+                                      <p:cBhvr>
+                                        <p:cTn id="25" dur="500"/>
+                                        <p:tgtEl>
+                                          <p:spTgt spid="16"/>
+                                        </p:tgtEl>
+                                      </p:cBhvr>
+                                    </p:animEffect>
+                                  </p:childTnLst>
+                                </p:cTn>
+                              </p:par>
+                            </p:childTnLst>
+                          </p:cTn>
+                        </p:par>
+                      </p:childTnLst>
+                    </p:cTn>
+                  </p:par>
+                  <p:par>
+                    <p:cTn id="26" fill="hold">
+                      <p:stCondLst>
+                        <p:cond delay="indefinite"/>
+                      </p:stCondLst>
+                      <p:childTnLst>
+                        <p:par>
+                          <p:cTn id="27" fill="hold">
+                            <p:stCondLst>
+                              <p:cond delay="0"/>
+                            </p:stCondLst>
+                            <p:childTnLst>
+                              <p:par>
+                                <p:cTn id="28" presetID="22" presetClass="entr" presetSubtype="8" fill="hold" nodeType="clickEffect">
+                                  <p:stCondLst>
+                                    <p:cond delay="0"/>
+                                  </p:stCondLst>
+                                  <p:childTnLst>
+                                    <p:set>
+                                      <p:cBhvr>
+                                        <p:cTn id="29" dur="1" fill="hold">
+                                          <p:stCondLst>
+                                            <p:cond delay="0"/>
+                                          </p:stCondLst>
+                                        </p:cTn>
+                                        <p:tgtEl>
+                                          <p:spTgt spid="27"/>
+                                        </p:tgtEl>
+                                        <p:attrNameLst>
+                                          <p:attrName>style.visibility</p:attrName>
+                                        </p:attrNameLst>
+                                      </p:cBhvr>
+                                      <p:to>
+                                        <p:strVal val="visible"/>
+                                      </p:to>
+                                    </p:set>
+                                    <p:animEffect transition="in" filter="wipe(left)">
+                                      <p:cBhvr>
+                                        <p:cTn id="30" dur="250"/>
+                                        <p:tgtEl>
+                                          <p:spTgt spid="27"/>
+                                        </p:tgtEl>
+                                      </p:cBhvr>
+                                    </p:animEffect>
+                                  </p:childTnLst>
+                                </p:cTn>
+                              </p:par>
+                            </p:childTnLst>
+                          </p:cTn>
+                        </p:par>
+                        <p:par>
+                          <p:cTn id="31" fill="hold">
+                            <p:stCondLst>
+                              <p:cond delay="250"/>
+                            </p:stCondLst>
+                            <p:childTnLst>
+                              <p:par>
+                                <p:cTn id="32" presetID="10" presetClass="entr" presetSubtype="0" fill="hold" nodeType="afterEffect">
+                                  <p:stCondLst>
+                                    <p:cond delay="0"/>
+                                  </p:stCondLst>
+                                  <p:childTnLst>
+                                    <p:set>
+                                      <p:cBhvr>
+                                        <p:cTn id="33" dur="1" fill="hold">
+                                          <p:stCondLst>
+                                            <p:cond delay="0"/>
+                                          </p:stCondLst>
+                                        </p:cTn>
+                                        <p:tgtEl>
+                                          <p:spTgt spid="14"/>
+                                        </p:tgtEl>
+                                        <p:attrNameLst>
+                                          <p:attrName>style.visibility</p:attrName>
+                                        </p:attrNameLst>
+                                      </p:cBhvr>
+                                      <p:to>
+                                        <p:strVal val="visible"/>
+                                      </p:to>
+                                    </p:set>
+                                    <p:animEffect transition="in" filter="fade">
+                                      <p:cBhvr>
+                                        <p:cTn id="34" dur="500"/>
+                                        <p:tgtEl>
+                                          <p:spTgt spid="14"/>
+                                        </p:tgtEl>
+                                      </p:cBhvr>
+                                    </p:animEffect>
+                                  </p:childTnLst>
+                                </p:cTn>
+                              </p:par>
+                            </p:childTnLst>
+                          </p:cTn>
+                        </p:par>
+                      </p:childTnLst>
+                    </p:cTn>
+                  </p:par>
+                  <p:par>
+                    <p:cTn id="35" fill="hold">
+                      <p:stCondLst>
+                        <p:cond delay="indefinite"/>
+                      </p:stCondLst>
+                      <p:childTnLst>
+                        <p:par>
+                          <p:cTn id="36" fill="hold">
+                            <p:stCondLst>
+                              <p:cond delay="0"/>
+                            </p:stCondLst>
+                            <p:childTnLst>
+                              <p:par>
+                                <p:cTn id="37" presetID="10" presetClass="entr" presetSubtype="0" fill="hold" nodeType="clickEffect">
+                                  <p:stCondLst>
+                                    <p:cond delay="0"/>
+                                  </p:stCondLst>
+                                  <p:childTnLst>
+                                    <p:set>
+                                      <p:cBhvr>
+                                        <p:cTn id="38" dur="1" fill="hold">
+                                          <p:stCondLst>
+                                            <p:cond delay="0"/>
+                                          </p:stCondLst>
+                                        </p:cTn>
+                                        <p:tgtEl>
+                                          <p:spTgt spid="22"/>
+                                        </p:tgtEl>
+                                        <p:attrNameLst>
+                                          <p:attrName>style.visibility</p:attrName>
+                                        </p:attrNameLst>
+                                      </p:cBhvr>
+                                      <p:to>
+                                        <p:strVal val="visible"/>
+                                      </p:to>
+                                    </p:set>
+                                    <p:animEffect transition="in" filter="fade">
+                                      <p:cBhvr>
+                                        <p:cTn id="39" dur="500"/>
+                                        <p:tgtEl>
+                                          <p:spTgt spid="22"/>
+                                        </p:tgtEl>
+                                      </p:cBhvr>
+                                    </p:animEffect>
+                                  </p:childTnLst>
+                                </p:cTn>
+                              </p:par>
+                            </p:childTnLst>
+                          </p:cTn>
+                        </p:par>
+                      </p:childTnLst>
+                    </p:cTn>
+                  </p:par>
+                  <p:par>
+                    <p:cTn id="40" fill="hold">
+                      <p:stCondLst>
+                        <p:cond delay="indefinite"/>
+                      </p:stCondLst>
+                      <p:childTnLst>
+                        <p:par>
+                          <p:cTn id="41" fill="hold">
+                            <p:stCondLst>
+                              <p:cond delay="0"/>
+                            </p:stCondLst>
+                            <p:childTnLst>
+                              <p:par>
+                                <p:cTn id="42" presetID="22" presetClass="entr" presetSubtype="8" fill="hold" nodeType="clickEffect">
+                                  <p:stCondLst>
+                                    <p:cond delay="0"/>
+                                  </p:stCondLst>
+                                  <p:childTnLst>
+                                    <p:set>
+                                      <p:cBhvr>
+                                        <p:cTn id="43" dur="1" fill="hold">
+                                          <p:stCondLst>
+                                            <p:cond delay="0"/>
+                                          </p:stCondLst>
+                                        </p:cTn>
+                                        <p:tgtEl>
+                                          <p:spTgt spid="5"/>
+                                        </p:tgtEl>
+                                        <p:attrNameLst>
+                                          <p:attrName>style.visibility</p:attrName>
+                                        </p:attrNameLst>
+                                      </p:cBhvr>
+                                      <p:to>
+                                        <p:strVal val="visible"/>
+                                      </p:to>
+                                    </p:set>
+                                    <p:animEffect transition="in" filter="wipe(left)">
+                                      <p:cBhvr>
+                                        <p:cTn id="44" dur="250"/>
+                                        <p:tgtEl>
+                                          <p:spTgt spid="5"/>
+                                        </p:tgtEl>
+                                      </p:cBhvr>
+                                    </p:animEffect>
+                                  </p:childTnLst>
+                                </p:cTn>
+                              </p:par>
+                            </p:childTnLst>
+                          </p:cTn>
+                        </p:par>
+                        <p:par>
+                          <p:cTn id="45" fill="hold">
+                            <p:stCondLst>
+                              <p:cond delay="250"/>
+                            </p:stCondLst>
+                            <p:childTnLst>
+                              <p:par>
+                                <p:cTn id="46" presetID="10" presetClass="entr" presetSubtype="0" fill="hold" nodeType="afterEffect">
+                                  <p:stCondLst>
+                                    <p:cond delay="0"/>
+                                  </p:stCondLst>
+                                  <p:childTnLst>
+                                    <p:set>
+                                      <p:cBhvr>
+                                        <p:cTn id="47" dur="1" fill="hold">
+                                          <p:stCondLst>
+                                            <p:cond delay="0"/>
+                                          </p:stCondLst>
+                                        </p:cTn>
+                                        <p:tgtEl>
+                                          <p:spTgt spid="29"/>
+                                        </p:tgtEl>
+                                        <p:attrNameLst>
+                                          <p:attrName>style.visibility</p:attrName>
+                                        </p:attrNameLst>
+                                      </p:cBhvr>
+                                      <p:to>
+                                        <p:strVal val="visible"/>
+                                      </p:to>
+                                    </p:set>
+                                    <p:animEffect transition="in" filter="fade">
+                                      <p:cBhvr>
+                                        <p:cTn id="48" dur="500"/>
+                                        <p:tgtEl>
+                                          <p:spTgt spid="29"/>
+                                        </p:tgtEl>
+                                      </p:cBhvr>
+                                    </p:animEffect>
+                                  </p:childTnLst>
+                                </p:cTn>
+                              </p:par>
+                            </p:childTnLst>
+                          </p:cTn>
+                        </p:par>
+                      </p:childTnLst>
+                    </p:cTn>
+                  </p:par>
+                  <p:par>
+                    <p:cTn id="49" fill="hold">
+                      <p:stCondLst>
+                        <p:cond delay="indefinite"/>
+                      </p:stCondLst>
+                      <p:childTnLst>
+                        <p:par>
+                          <p:cTn id="50" fill="hold">
+                            <p:stCondLst>
+                              <p:cond delay="0"/>
+                            </p:stCondLst>
+                            <p:childTnLst>
+                              <p:par>
+                                <p:cTn id="51" presetID="21" presetClass="entr" presetSubtype="1" fill="hold" nodeType="clickEffect">
+                                  <p:stCondLst>
+                                    <p:cond delay="0"/>
+                                  </p:stCondLst>
+                                  <p:childTnLst>
+                                    <p:set>
+                                      <p:cBhvr>
+                                        <p:cTn id="52" dur="1" fill="hold">
+                                          <p:stCondLst>
+                                            <p:cond delay="0"/>
+                                          </p:stCondLst>
+                                        </p:cTn>
+                                        <p:tgtEl>
+                                          <p:spTgt spid="13"/>
+                                        </p:tgtEl>
+                                        <p:attrNameLst>
+                                          <p:attrName>style.visibility</p:attrName>
+                                        </p:attrNameLst>
+                                      </p:cBhvr>
+                                      <p:to>
+                                        <p:strVal val="visible"/>
+                                      </p:to>
+                                    </p:set>
+                                    <p:animEffect transition="in" filter="wheel(1)">
+                                      <p:cBhvr>
+                                        <p:cTn id="53" dur="500"/>
+                                        <p:tgtEl>
+                                          <p:spTgt spid="13"/>
+                                        </p:tgtEl>
+                                      </p:cBhvr>
+                                    </p:animEffect>
+                                  </p:childTnLst>
+                                </p:cTn>
+                              </p:par>
+                            </p:childTnLst>
+                          </p:cTn>
+                        </p:par>
+                      </p:childTnLst>
+                    </p:cTn>
+                  </p:par>
+                  <p:par>
+                    <p:cTn id="54" fill="hold">
+                      <p:stCondLst>
+                        <p:cond delay="indefinite"/>
+                      </p:stCondLst>
+                      <p:childTnLst>
+                        <p:par>
+                          <p:cTn id="55" fill="hold">
+                            <p:stCondLst>
+                              <p:cond delay="0"/>
+                            </p:stCondLst>
+                            <p:childTnLst>
+                              <p:par>
+                                <p:cTn id="56" presetID="22" presetClass="entr" presetSubtype="8" fill="hold" nodeType="clickEffect">
+                                  <p:stCondLst>
+                                    <p:cond delay="0"/>
+                                  </p:stCondLst>
+                                  <p:childTnLst>
+                                    <p:set>
+                                      <p:cBhvr>
+                                        <p:cTn id="57" dur="1" fill="hold">
+                                          <p:stCondLst>
+                                            <p:cond delay="0"/>
+                                          </p:stCondLst>
+                                        </p:cTn>
+                                        <p:tgtEl>
+                                          <p:spTgt spid="9"/>
+                                        </p:tgtEl>
+                                        <p:attrNameLst>
+                                          <p:attrName>style.visibility</p:attrName>
+                                        </p:attrNameLst>
+                                      </p:cBhvr>
+                                      <p:to>
+                                        <p:strVal val="visible"/>
+                                      </p:to>
+                                    </p:set>
+                                    <p:animEffect transition="in" filter="wipe(left)">
+                                      <p:cBhvr>
+                                        <p:cTn id="58" dur="250"/>
+                                        <p:tgtEl>
+                                          <p:spTgt spid="9"/>
+                                        </p:tgtEl>
+                                      </p:cBhvr>
+                                    </p:animEffect>
+                                  </p:childTnLst>
+                                </p:cTn>
+                              </p:par>
+                            </p:childTnLst>
+                          </p:cTn>
+                        </p:par>
+                      </p:childTnLst>
+                    </p:cTn>
+                  </p:par>
+                  <p:par>
+                    <p:cTn id="59" fill="hold">
+                      <p:stCondLst>
+                        <p:cond delay="indefinite"/>
+                      </p:stCondLst>
+                      <p:childTnLst>
+                        <p:par>
+                          <p:cTn id="60" fill="hold">
+                            <p:stCondLst>
+                              <p:cond delay="0"/>
+                            </p:stCondLst>
+                            <p:childTnLst>
+                              <p:par>
+                                <p:cTn id="61" presetID="10" presetClass="entr" presetSubtype="0" fill="hold" nodeType="clickEffect">
+                                  <p:stCondLst>
+                                    <p:cond delay="0"/>
+                                  </p:stCondLst>
+                                  <p:childTnLst>
+                                    <p:set>
+                                      <p:cBhvr>
+                                        <p:cTn id="62" dur="1" fill="hold">
+                                          <p:stCondLst>
+                                            <p:cond delay="0"/>
+                                          </p:stCondLst>
+                                        </p:cTn>
+                                        <p:tgtEl>
+                                          <p:spTgt spid="26"/>
+                                        </p:tgtEl>
+                                        <p:attrNameLst>
+                                          <p:attrName>style.visibility</p:attrName>
+                                        </p:attrNameLst>
+                                      </p:cBhvr>
+                                      <p:to>
+                                        <p:strVal val="visible"/>
+                                      </p:to>
+                                    </p:set>
+                                    <p:animEffect transition="in" filter="fade">
+                                      <p:cBhvr>
+                                        <p:cTn id="63" dur="500"/>
+                                        <p:tgtEl>
+                                          <p:spTgt spid="26"/>
+                                        </p:tgtEl>
+                                      </p:cBhvr>
+                                    </p:animEffect>
+                                  </p:childTnLst>
+                                </p:cTn>
+                              </p:par>
+                            </p:childTnLst>
+                          </p:cTn>
+                        </p:par>
+                      </p:childTnLst>
+                    </p:cTn>
+                  </p:par>
+                </p:childTnLst>
+              </p:cTn>
+              <p:prevCondLst>
+                <p:cond evt="onPrev" delay="0">
+                  <p:tgtEl>
+                    <p:sldTgt/>
+                  </p:tgtEl>
+                </p:cond>
+              </p:prevCondLst>
+              <p:nextCondLst>
+                <p:cond evt="onNext" delay="0">
+                  <p:tgtEl>
+                    <p:sldTgt/>
+                  </p:tgtEl>
+                </p:cond>
+              </p:nextCondLst>
+            </p:seq>
+          </p:childTnLst>
+        </p:cTn>
+      </p:par>
+    </p:tnLst>
+  </p:timing>
 </p:sld>
 </file>
 
@@ -10135,7 +11256,7 @@
                 <a:latin typeface="Chakra Petch" panose="00000500000000000000" pitchFamily="2" charset="-34"/>
                 <a:cs typeface="Chakra Petch" panose="00000500000000000000" pitchFamily="2" charset="-34"/>
               </a:rPr>
-              <a:t>Materials and Methods</a:t>
+              <a:t>The Plan</a:t>
             </a:r>
           </a:p>
         </p:txBody>
@@ -10171,7 +11292,7 @@
         </p:blipFill>
         <p:spPr>
           <a:xfrm>
-            <a:off x="681075" y="2808916"/>
+            <a:off x="1416833" y="2552218"/>
             <a:ext cx="914400" cy="914400"/>
           </a:xfrm>
           <a:prstGeom prst="rect">
@@ -10210,7 +11331,7 @@
         </p:blipFill>
         <p:spPr>
           <a:xfrm>
-            <a:off x="687134" y="3704266"/>
+            <a:off x="1422892" y="3447568"/>
             <a:ext cx="914400" cy="914400"/>
           </a:xfrm>
           <a:prstGeom prst="rect">
@@ -10249,7 +11370,7 @@
         </p:blipFill>
         <p:spPr>
           <a:xfrm>
-            <a:off x="1601534" y="3704266"/>
+            <a:off x="2337292" y="3447568"/>
             <a:ext cx="914400" cy="914400"/>
           </a:xfrm>
           <a:prstGeom prst="rect">
@@ -10287,46 +11408,7 @@
         </p:blipFill>
         <p:spPr>
           <a:xfrm>
-            <a:off x="1595475" y="2808916"/>
-            <a:ext cx="914400" cy="914400"/>
-          </a:xfrm>
-          <a:prstGeom prst="rect">
-            <a:avLst/>
-          </a:prstGeom>
-        </p:spPr>
-      </p:pic>
-      <p:pic>
-        <p:nvPicPr>
-          <p:cNvPr id="12" name="Graphic 11" descr="Layers Design outline">
-            <a:extLst>
-              <a:ext uri="{FF2B5EF4-FFF2-40B4-BE49-F238E27FC236}">
-                <a16:creationId xmlns:a16="http://schemas.microsoft.com/office/drawing/2014/main" id="{8128282E-4B22-8AB1-5EF2-6BF1F1038010}"/>
-              </a:ext>
-            </a:extLst>
-          </p:cNvPr>
-          <p:cNvPicPr>
-            <a:picLocks noChangeAspect="1"/>
-          </p:cNvPicPr>
-          <p:nvPr/>
-        </p:nvPicPr>
-        <p:blipFill>
-          <a:blip r:embed="rId10">
-            <a:extLst>
-              <a:ext uri="{28A0092B-C50C-407E-A947-70E740481C1C}">
-                <a14:useLocalDpi xmlns:a14="http://schemas.microsoft.com/office/drawing/2010/main" val="0"/>
-              </a:ext>
-              <a:ext uri="{96DAC541-7B7A-43D3-8B79-37D633B846F1}">
-                <asvg:svgBlip xmlns:asvg="http://schemas.microsoft.com/office/drawing/2016/SVG/main" r:embed="rId11"/>
-              </a:ext>
-            </a:extLst>
-          </a:blip>
-          <a:stretch>
-            <a:fillRect/>
-          </a:stretch>
-        </p:blipFill>
-        <p:spPr>
-          <a:xfrm>
-            <a:off x="9325051" y="5563083"/>
+            <a:off x="2331233" y="2552218"/>
             <a:ext cx="914400" cy="914400"/>
           </a:xfrm>
           <a:prstGeom prst="rect">
@@ -10349,13 +11431,13 @@
           <p:nvPr/>
         </p:nvPicPr>
         <p:blipFill>
-          <a:blip r:embed="rId12">
+          <a:blip r:embed="rId10">
             <a:extLst>
               <a:ext uri="{28A0092B-C50C-407E-A947-70E740481C1C}">
                 <a14:useLocalDpi xmlns:a14="http://schemas.microsoft.com/office/drawing/2010/main" val="0"/>
               </a:ext>
               <a:ext uri="{96DAC541-7B7A-43D3-8B79-37D633B846F1}">
-                <asvg:svgBlip xmlns:asvg="http://schemas.microsoft.com/office/drawing/2016/SVG/main" r:embed="rId13"/>
+                <asvg:svgBlip xmlns:asvg="http://schemas.microsoft.com/office/drawing/2016/SVG/main" r:embed="rId11"/>
               </a:ext>
             </a:extLst>
           </a:blip>
@@ -10365,7 +11447,7 @@
         </p:blipFill>
         <p:spPr>
           <a:xfrm>
-            <a:off x="6066007" y="3285166"/>
+            <a:off x="6305523" y="2969400"/>
             <a:ext cx="914400" cy="914400"/>
           </a:xfrm>
           <a:prstGeom prst="rect">
@@ -10388,13 +11470,13 @@
           <p:nvPr/>
         </p:nvPicPr>
         <p:blipFill>
-          <a:blip r:embed="rId14">
+          <a:blip r:embed="rId12">
             <a:extLst>
               <a:ext uri="{28A0092B-C50C-407E-A947-70E740481C1C}">
                 <a14:useLocalDpi xmlns:a14="http://schemas.microsoft.com/office/drawing/2010/main" val="0"/>
               </a:ext>
               <a:ext uri="{96DAC541-7B7A-43D3-8B79-37D633B846F1}">
-                <asvg:svgBlip xmlns:asvg="http://schemas.microsoft.com/office/drawing/2016/SVG/main" r:embed="rId15"/>
+                <asvg:svgBlip xmlns:asvg="http://schemas.microsoft.com/office/drawing/2016/SVG/main" r:embed="rId13"/>
               </a:ext>
             </a:extLst>
           </a:blip>
@@ -10404,85 +11486,7 @@
         </p:blipFill>
         <p:spPr>
           <a:xfrm>
-            <a:off x="4003060" y="3293732"/>
-            <a:ext cx="914400" cy="914400"/>
-          </a:xfrm>
-          <a:prstGeom prst="rect">
-            <a:avLst/>
-          </a:prstGeom>
-        </p:spPr>
-      </p:pic>
-      <p:pic>
-        <p:nvPicPr>
-          <p:cNvPr id="18" name="Graphic 17" descr="Illustrator outline">
-            <a:extLst>
-              <a:ext uri="{FF2B5EF4-FFF2-40B4-BE49-F238E27FC236}">
-                <a16:creationId xmlns:a16="http://schemas.microsoft.com/office/drawing/2014/main" id="{AB7ED2FB-C643-18C6-C91B-04B8AFCA0360}"/>
-              </a:ext>
-            </a:extLst>
-          </p:cNvPr>
-          <p:cNvPicPr>
-            <a:picLocks noChangeAspect="1"/>
-          </p:cNvPicPr>
-          <p:nvPr/>
-        </p:nvPicPr>
-        <p:blipFill>
-          <a:blip r:embed="rId16">
-            <a:extLst>
-              <a:ext uri="{28A0092B-C50C-407E-A947-70E740481C1C}">
-                <a14:useLocalDpi xmlns:a14="http://schemas.microsoft.com/office/drawing/2010/main" val="0"/>
-              </a:ext>
-              <a:ext uri="{96DAC541-7B7A-43D3-8B79-37D633B846F1}">
-                <asvg:svgBlip xmlns:asvg="http://schemas.microsoft.com/office/drawing/2016/SVG/main" r:embed="rId17"/>
-              </a:ext>
-            </a:extLst>
-          </a:blip>
-          <a:stretch>
-            <a:fillRect/>
-          </a:stretch>
-        </p:blipFill>
-        <p:spPr>
-          <a:xfrm>
-            <a:off x="9277502" y="3293732"/>
-            <a:ext cx="914400" cy="914400"/>
-          </a:xfrm>
-          <a:prstGeom prst="rect">
-            <a:avLst/>
-          </a:prstGeom>
-        </p:spPr>
-      </p:pic>
-      <p:pic>
-        <p:nvPicPr>
-          <p:cNvPr id="20" name="Graphic 19" descr="Table outline">
-            <a:extLst>
-              <a:ext uri="{FF2B5EF4-FFF2-40B4-BE49-F238E27FC236}">
-                <a16:creationId xmlns:a16="http://schemas.microsoft.com/office/drawing/2014/main" id="{280EF6F1-8A1B-84AA-9D70-886AC2852591}"/>
-              </a:ext>
-            </a:extLst>
-          </p:cNvPr>
-          <p:cNvPicPr>
-            <a:picLocks noChangeAspect="1"/>
-          </p:cNvPicPr>
-          <p:nvPr/>
-        </p:nvPicPr>
-        <p:blipFill>
-          <a:blip r:embed="rId18">
-            <a:extLst>
-              <a:ext uri="{28A0092B-C50C-407E-A947-70E740481C1C}">
-                <a14:useLocalDpi xmlns:a14="http://schemas.microsoft.com/office/drawing/2010/main" val="0"/>
-              </a:ext>
-              <a:ext uri="{96DAC541-7B7A-43D3-8B79-37D633B846F1}">
-                <asvg:svgBlip xmlns:asvg="http://schemas.microsoft.com/office/drawing/2016/SVG/main" r:embed="rId19"/>
-              </a:ext>
-            </a:extLst>
-          </a:blip>
-          <a:stretch>
-            <a:fillRect/>
-          </a:stretch>
-        </p:blipFill>
-        <p:spPr>
-          <a:xfrm>
-            <a:off x="10744125" y="4590091"/>
+            <a:off x="4317106" y="2971800"/>
             <a:ext cx="914400" cy="914400"/>
           </a:xfrm>
           <a:prstGeom prst="rect">
@@ -10505,13 +11509,13 @@
           <p:nvPr/>
         </p:nvPicPr>
         <p:blipFill>
-          <a:blip r:embed="rId20">
+          <a:blip r:embed="rId14">
             <a:extLst>
               <a:ext uri="{28A0092B-C50C-407E-A947-70E740481C1C}">
                 <a14:useLocalDpi xmlns:a14="http://schemas.microsoft.com/office/drawing/2010/main" val="0"/>
               </a:ext>
               <a:ext uri="{96DAC541-7B7A-43D3-8B79-37D633B846F1}">
-                <asvg:svgBlip xmlns:asvg="http://schemas.microsoft.com/office/drawing/2016/SVG/main" r:embed="rId21"/>
+                <asvg:svgBlip xmlns:asvg="http://schemas.microsoft.com/office/drawing/2016/SVG/main" r:embed="rId15"/>
               </a:ext>
             </a:extLst>
           </a:blip>
@@ -10521,7 +11525,7 @@
         </p:blipFill>
         <p:spPr>
           <a:xfrm>
-            <a:off x="6955963" y="2494591"/>
+            <a:off x="7130123" y="2206542"/>
             <a:ext cx="914400" cy="914400"/>
           </a:xfrm>
           <a:prstGeom prst="rect">
@@ -10544,13 +11548,13 @@
           <p:nvPr/>
         </p:nvPicPr>
         <p:blipFill>
-          <a:blip r:embed="rId22">
+          <a:blip r:embed="rId16">
             <a:extLst>
               <a:ext uri="{28A0092B-C50C-407E-A947-70E740481C1C}">
                 <a14:useLocalDpi xmlns:a14="http://schemas.microsoft.com/office/drawing/2010/main" val="0"/>
               </a:ext>
               <a:ext uri="{96DAC541-7B7A-43D3-8B79-37D633B846F1}">
-                <asvg:svgBlip xmlns:asvg="http://schemas.microsoft.com/office/drawing/2016/SVG/main" r:embed="rId23"/>
+                <asvg:svgBlip xmlns:asvg="http://schemas.microsoft.com/office/drawing/2016/SVG/main" r:embed="rId17"/>
               </a:ext>
             </a:extLst>
           </a:blip>
@@ -10560,7 +11564,514 @@
         </p:blipFill>
         <p:spPr>
           <a:xfrm flipV="1">
-            <a:off x="6980407" y="3246107"/>
+            <a:off x="7206162" y="2901147"/>
+            <a:ext cx="914400" cy="914400"/>
+          </a:xfrm>
+          <a:prstGeom prst="rect">
+            <a:avLst/>
+          </a:prstGeom>
+        </p:spPr>
+      </p:pic>
+      <p:pic>
+        <p:nvPicPr>
+          <p:cNvPr id="9" name="Graphic 8" descr="Arrow Right with solid fill">
+            <a:extLst>
+              <a:ext uri="{FF2B5EF4-FFF2-40B4-BE49-F238E27FC236}">
+                <a16:creationId xmlns:a16="http://schemas.microsoft.com/office/drawing/2014/main" id="{447AA9CC-5D1B-9AE1-6486-2A65075C5B48}"/>
+              </a:ext>
+            </a:extLst>
+          </p:cNvPr>
+          <p:cNvPicPr>
+            <a:picLocks noChangeAspect="1"/>
+          </p:cNvPicPr>
+          <p:nvPr/>
+        </p:nvPicPr>
+        <p:blipFill>
+          <a:blip r:embed="rId18">
+            <a:extLst>
+              <a:ext uri="{28A0092B-C50C-407E-A947-70E740481C1C}">
+                <a14:useLocalDpi xmlns:a14="http://schemas.microsoft.com/office/drawing/2010/main" val="0"/>
+              </a:ext>
+              <a:ext uri="{96DAC541-7B7A-43D3-8B79-37D633B846F1}">
+                <asvg:svgBlip xmlns:asvg="http://schemas.microsoft.com/office/drawing/2016/SVG/main" r:embed="rId19"/>
+              </a:ext>
+            </a:extLst>
+          </a:blip>
+          <a:stretch>
+            <a:fillRect/>
+          </a:stretch>
+        </p:blipFill>
+        <p:spPr>
+          <a:xfrm>
+            <a:off x="8924667" y="2969400"/>
+            <a:ext cx="914400" cy="914400"/>
+          </a:xfrm>
+          <a:prstGeom prst="rect">
+            <a:avLst/>
+          </a:prstGeom>
+        </p:spPr>
+      </p:pic>
+      <p:pic>
+        <p:nvPicPr>
+          <p:cNvPr id="13" name="Graphic 12" descr="Line arrow: Rotate right with solid fill">
+            <a:extLst>
+              <a:ext uri="{FF2B5EF4-FFF2-40B4-BE49-F238E27FC236}">
+                <a16:creationId xmlns:a16="http://schemas.microsoft.com/office/drawing/2014/main" id="{44804FB3-E78C-F1A7-5330-AC1883D473E0}"/>
+              </a:ext>
+            </a:extLst>
+          </p:cNvPr>
+          <p:cNvPicPr>
+            <a:picLocks noChangeAspect="1"/>
+          </p:cNvPicPr>
+          <p:nvPr/>
+        </p:nvPicPr>
+        <p:blipFill>
+          <a:blip r:embed="rId20">
+            <a:extLst>
+              <a:ext uri="{28A0092B-C50C-407E-A947-70E740481C1C}">
+                <a14:useLocalDpi xmlns:a14="http://schemas.microsoft.com/office/drawing/2010/main" val="0"/>
+              </a:ext>
+              <a:ext uri="{96DAC541-7B7A-43D3-8B79-37D633B846F1}">
+                <asvg:svgBlip xmlns:asvg="http://schemas.microsoft.com/office/drawing/2016/SVG/main" r:embed="rId21"/>
+              </a:ext>
+            </a:extLst>
+          </a:blip>
+          <a:stretch>
+            <a:fillRect/>
+          </a:stretch>
+        </p:blipFill>
+        <p:spPr>
+          <a:xfrm rot="13302510">
+            <a:off x="7345764" y="3522836"/>
+            <a:ext cx="914400" cy="914400"/>
+          </a:xfrm>
+          <a:prstGeom prst="rect">
+            <a:avLst/>
+          </a:prstGeom>
+        </p:spPr>
+      </p:pic>
+      <p:pic>
+        <p:nvPicPr>
+          <p:cNvPr id="26" name="Graphic 25" descr="Workflow with solid fill">
+            <a:extLst>
+              <a:ext uri="{FF2B5EF4-FFF2-40B4-BE49-F238E27FC236}">
+                <a16:creationId xmlns:a16="http://schemas.microsoft.com/office/drawing/2014/main" id="{04314610-BCC9-2DD4-0413-0FA5102FF3B5}"/>
+              </a:ext>
+            </a:extLst>
+          </p:cNvPr>
+          <p:cNvPicPr>
+            <a:picLocks noChangeAspect="1"/>
+          </p:cNvPicPr>
+          <p:nvPr/>
+        </p:nvPicPr>
+        <p:blipFill>
+          <a:blip r:embed="rId22">
+            <a:extLst>
+              <a:ext uri="{28A0092B-C50C-407E-A947-70E740481C1C}">
+                <a14:useLocalDpi xmlns:a14="http://schemas.microsoft.com/office/drawing/2010/main" val="0"/>
+              </a:ext>
+              <a:ext uri="{96DAC541-7B7A-43D3-8B79-37D633B846F1}">
+                <asvg:svgBlip xmlns:asvg="http://schemas.microsoft.com/office/drawing/2016/SVG/main" r:embed="rId23"/>
+              </a:ext>
+            </a:extLst>
+          </a:blip>
+          <a:stretch>
+            <a:fillRect/>
+          </a:stretch>
+        </p:blipFill>
+        <p:spPr>
+          <a:xfrm>
+            <a:off x="9858058" y="2969400"/>
+            <a:ext cx="914400" cy="914400"/>
+          </a:xfrm>
+          <a:prstGeom prst="rect">
+            <a:avLst/>
+          </a:prstGeom>
+        </p:spPr>
+      </p:pic>
+      <p:pic>
+        <p:nvPicPr>
+          <p:cNvPr id="27" name="Graphic 26" descr="Arrow Right with solid fill">
+            <a:extLst>
+              <a:ext uri="{FF2B5EF4-FFF2-40B4-BE49-F238E27FC236}">
+                <a16:creationId xmlns:a16="http://schemas.microsoft.com/office/drawing/2014/main" id="{7E3232CE-E992-70D1-FD3C-2EDBA42304AD}"/>
+              </a:ext>
+            </a:extLst>
+          </p:cNvPr>
+          <p:cNvPicPr>
+            <a:picLocks noChangeAspect="1"/>
+          </p:cNvPicPr>
+          <p:nvPr/>
+        </p:nvPicPr>
+        <p:blipFill>
+          <a:blip r:embed="rId18">
+            <a:extLst>
+              <a:ext uri="{28A0092B-C50C-407E-A947-70E740481C1C}">
+                <a14:useLocalDpi xmlns:a14="http://schemas.microsoft.com/office/drawing/2010/main" val="0"/>
+              </a:ext>
+              <a:ext uri="{96DAC541-7B7A-43D3-8B79-37D633B846F1}">
+                <asvg:svgBlip xmlns:asvg="http://schemas.microsoft.com/office/drawing/2016/SVG/main" r:embed="rId19"/>
+              </a:ext>
+            </a:extLst>
+          </a:blip>
+          <a:stretch>
+            <a:fillRect/>
+          </a:stretch>
+        </p:blipFill>
+        <p:spPr>
+          <a:xfrm>
+            <a:off x="5309661" y="2969400"/>
+            <a:ext cx="914400" cy="914400"/>
+          </a:xfrm>
+          <a:prstGeom prst="rect">
+            <a:avLst/>
+          </a:prstGeom>
+        </p:spPr>
+      </p:pic>
+      <p:pic>
+        <p:nvPicPr>
+          <p:cNvPr id="29" name="Graphic 28" descr="Scatterplot with solid fill">
+            <a:extLst>
+              <a:ext uri="{FF2B5EF4-FFF2-40B4-BE49-F238E27FC236}">
+                <a16:creationId xmlns:a16="http://schemas.microsoft.com/office/drawing/2014/main" id="{C2048285-7293-48E1-E144-EB95E952F3E6}"/>
+              </a:ext>
+            </a:extLst>
+          </p:cNvPr>
+          <p:cNvPicPr>
+            <a:picLocks noChangeAspect="1"/>
+          </p:cNvPicPr>
+          <p:nvPr/>
+        </p:nvPicPr>
+        <p:blipFill>
+          <a:blip r:embed="rId24">
+            <a:extLst>
+              <a:ext uri="{28A0092B-C50C-407E-A947-70E740481C1C}">
+                <a14:useLocalDpi xmlns:a14="http://schemas.microsoft.com/office/drawing/2010/main" val="0"/>
+              </a:ext>
+              <a:ext uri="{96DAC541-7B7A-43D3-8B79-37D633B846F1}">
+                <asvg:svgBlip xmlns:asvg="http://schemas.microsoft.com/office/drawing/2016/SVG/main" r:embed="rId25"/>
+              </a:ext>
+            </a:extLst>
+          </a:blip>
+          <a:stretch>
+            <a:fillRect/>
+          </a:stretch>
+        </p:blipFill>
+        <p:spPr>
+          <a:xfrm>
+            <a:off x="8036185" y="2969400"/>
+            <a:ext cx="914400" cy="914400"/>
+          </a:xfrm>
+          <a:prstGeom prst="rect">
+            <a:avLst/>
+          </a:prstGeom>
+        </p:spPr>
+      </p:pic>
+      <p:pic>
+        <p:nvPicPr>
+          <p:cNvPr id="31" name="Graphic 30" descr="Arrow Right with solid fill">
+            <a:extLst>
+              <a:ext uri="{FF2B5EF4-FFF2-40B4-BE49-F238E27FC236}">
+                <a16:creationId xmlns:a16="http://schemas.microsoft.com/office/drawing/2014/main" id="{556F1497-DC9A-FCB0-6D57-EADCC586CD7D}"/>
+              </a:ext>
+            </a:extLst>
+          </p:cNvPr>
+          <p:cNvPicPr>
+            <a:picLocks noChangeAspect="1"/>
+          </p:cNvPicPr>
+          <p:nvPr/>
+        </p:nvPicPr>
+        <p:blipFill>
+          <a:blip r:embed="rId18">
+            <a:extLst>
+              <a:ext uri="{28A0092B-C50C-407E-A947-70E740481C1C}">
+                <a14:useLocalDpi xmlns:a14="http://schemas.microsoft.com/office/drawing/2010/main" val="0"/>
+              </a:ext>
+              <a:ext uri="{96DAC541-7B7A-43D3-8B79-37D633B846F1}">
+                <asvg:svgBlip xmlns:asvg="http://schemas.microsoft.com/office/drawing/2016/SVG/main" r:embed="rId19"/>
+              </a:ext>
+            </a:extLst>
+          </a:blip>
+          <a:stretch>
+            <a:fillRect/>
+          </a:stretch>
+        </p:blipFill>
+        <p:spPr>
+          <a:xfrm>
+            <a:off x="3327095" y="2971800"/>
+            <a:ext cx="914400" cy="914400"/>
+          </a:xfrm>
+          <a:prstGeom prst="rect">
+            <a:avLst/>
+          </a:prstGeom>
+        </p:spPr>
+      </p:pic>
+      <p:pic>
+        <p:nvPicPr>
+          <p:cNvPr id="3" name="Graphic 2" descr="Layers Design outline">
+            <a:extLst>
+              <a:ext uri="{FF2B5EF4-FFF2-40B4-BE49-F238E27FC236}">
+                <a16:creationId xmlns:a16="http://schemas.microsoft.com/office/drawing/2014/main" id="{FD490D8D-4512-36E0-1CAE-C16B359EBE67}"/>
+              </a:ext>
+            </a:extLst>
+          </p:cNvPr>
+          <p:cNvPicPr>
+            <a:picLocks noChangeAspect="1"/>
+          </p:cNvPicPr>
+          <p:nvPr/>
+        </p:nvPicPr>
+        <p:blipFill>
+          <a:blip r:embed="rId26">
+            <a:extLst>
+              <a:ext uri="{28A0092B-C50C-407E-A947-70E740481C1C}">
+                <a14:useLocalDpi xmlns:a14="http://schemas.microsoft.com/office/drawing/2010/main" val="0"/>
+              </a:ext>
+              <a:ext uri="{96DAC541-7B7A-43D3-8B79-37D633B846F1}">
+                <asvg:svgBlip xmlns:asvg="http://schemas.microsoft.com/office/drawing/2016/SVG/main" r:embed="rId27"/>
+              </a:ext>
+            </a:extLst>
+          </a:blip>
+          <a:stretch>
+            <a:fillRect/>
+          </a:stretch>
+        </p:blipFill>
+        <p:spPr>
+          <a:xfrm>
+            <a:off x="8213311" y="5776295"/>
+            <a:ext cx="914400" cy="914400"/>
+          </a:xfrm>
+          <a:prstGeom prst="rect">
+            <a:avLst/>
+          </a:prstGeom>
+        </p:spPr>
+      </p:pic>
+      <p:pic>
+        <p:nvPicPr>
+          <p:cNvPr id="7" name="Graphic 6" descr="Illustrator outline">
+            <a:extLst>
+              <a:ext uri="{FF2B5EF4-FFF2-40B4-BE49-F238E27FC236}">
+                <a16:creationId xmlns:a16="http://schemas.microsoft.com/office/drawing/2014/main" id="{1C08C13A-3809-8254-4BEA-491970B19B47}"/>
+              </a:ext>
+            </a:extLst>
+          </p:cNvPr>
+          <p:cNvPicPr>
+            <a:picLocks noChangeAspect="1"/>
+          </p:cNvPicPr>
+          <p:nvPr/>
+        </p:nvPicPr>
+        <p:blipFill>
+          <a:blip r:embed="rId28">
+            <a:extLst>
+              <a:ext uri="{28A0092B-C50C-407E-A947-70E740481C1C}">
+                <a14:useLocalDpi xmlns:a14="http://schemas.microsoft.com/office/drawing/2010/main" val="0"/>
+              </a:ext>
+              <a:ext uri="{96DAC541-7B7A-43D3-8B79-37D633B846F1}">
+                <asvg:svgBlip xmlns:asvg="http://schemas.microsoft.com/office/drawing/2016/SVG/main" r:embed="rId29"/>
+              </a:ext>
+            </a:extLst>
+          </a:blip>
+          <a:stretch>
+            <a:fillRect/>
+          </a:stretch>
+        </p:blipFill>
+        <p:spPr>
+          <a:xfrm>
+            <a:off x="2244255" y="5669293"/>
+            <a:ext cx="914400" cy="914400"/>
+          </a:xfrm>
+          <a:prstGeom prst="rect">
+            <a:avLst/>
+          </a:prstGeom>
+        </p:spPr>
+      </p:pic>
+      <p:pic>
+        <p:nvPicPr>
+          <p:cNvPr id="11" name="Graphic 10" descr="Table outline">
+            <a:extLst>
+              <a:ext uri="{FF2B5EF4-FFF2-40B4-BE49-F238E27FC236}">
+                <a16:creationId xmlns:a16="http://schemas.microsoft.com/office/drawing/2014/main" id="{6BC91D82-ADE8-0117-5244-D68F2F07D07A}"/>
+              </a:ext>
+            </a:extLst>
+          </p:cNvPr>
+          <p:cNvPicPr>
+            <a:picLocks noChangeAspect="1"/>
+          </p:cNvPicPr>
+          <p:nvPr/>
+        </p:nvPicPr>
+        <p:blipFill>
+          <a:blip r:embed="rId30">
+            <a:extLst>
+              <a:ext uri="{28A0092B-C50C-407E-A947-70E740481C1C}">
+                <a14:useLocalDpi xmlns:a14="http://schemas.microsoft.com/office/drawing/2010/main" val="0"/>
+              </a:ext>
+              <a:ext uri="{96DAC541-7B7A-43D3-8B79-37D633B846F1}">
+                <asvg:svgBlip xmlns:asvg="http://schemas.microsoft.com/office/drawing/2016/SVG/main" r:embed="rId31"/>
+              </a:ext>
+            </a:extLst>
+          </a:blip>
+          <a:stretch>
+            <a:fillRect/>
+          </a:stretch>
+        </p:blipFill>
+        <p:spPr>
+          <a:xfrm>
+            <a:off x="10839375" y="5212093"/>
+            <a:ext cx="914400" cy="914400"/>
+          </a:xfrm>
+          <a:prstGeom prst="rect">
+            <a:avLst/>
+          </a:prstGeom>
+        </p:spPr>
+      </p:pic>
+      <p:pic>
+        <p:nvPicPr>
+          <p:cNvPr id="15" name="Graphic 14" descr="Line arrow: Slight curve with solid fill">
+            <a:extLst>
+              <a:ext uri="{FF2B5EF4-FFF2-40B4-BE49-F238E27FC236}">
+                <a16:creationId xmlns:a16="http://schemas.microsoft.com/office/drawing/2014/main" id="{9EE45F9E-1B34-2306-0BDA-9112318A041A}"/>
+              </a:ext>
+            </a:extLst>
+          </p:cNvPr>
+          <p:cNvPicPr>
+            <a:picLocks noChangeAspect="1"/>
+          </p:cNvPicPr>
+          <p:nvPr/>
+        </p:nvPicPr>
+        <p:blipFill>
+          <a:blip r:embed="rId32">
+            <a:extLst>
+              <a:ext uri="{28A0092B-C50C-407E-A947-70E740481C1C}">
+                <a14:useLocalDpi xmlns:a14="http://schemas.microsoft.com/office/drawing/2010/main" val="0"/>
+              </a:ext>
+              <a:ext uri="{96DAC541-7B7A-43D3-8B79-37D633B846F1}">
+                <asvg:svgBlip xmlns:asvg="http://schemas.microsoft.com/office/drawing/2016/SVG/main" r:embed="rId33"/>
+              </a:ext>
+            </a:extLst>
+          </a:blip>
+          <a:stretch>
+            <a:fillRect/>
+          </a:stretch>
+        </p:blipFill>
+        <p:spPr>
+          <a:xfrm>
+            <a:off x="3616648" y="5776295"/>
+            <a:ext cx="914400" cy="914400"/>
+          </a:xfrm>
+          <a:prstGeom prst="rect">
+            <a:avLst/>
+          </a:prstGeom>
+        </p:spPr>
+      </p:pic>
+      <p:pic>
+        <p:nvPicPr>
+          <p:cNvPr id="19" name="Graphic 18" descr="Line arrow: Horizontal U-turn with solid fill">
+            <a:extLst>
+              <a:ext uri="{FF2B5EF4-FFF2-40B4-BE49-F238E27FC236}">
+                <a16:creationId xmlns:a16="http://schemas.microsoft.com/office/drawing/2014/main" id="{62D7EDB6-1932-44BA-40E8-C60BEA52EFBA}"/>
+              </a:ext>
+            </a:extLst>
+          </p:cNvPr>
+          <p:cNvPicPr>
+            <a:picLocks noChangeAspect="1"/>
+          </p:cNvPicPr>
+          <p:nvPr/>
+        </p:nvPicPr>
+        <p:blipFill>
+          <a:blip r:embed="rId34">
+            <a:extLst>
+              <a:ext uri="{28A0092B-C50C-407E-A947-70E740481C1C}">
+                <a14:useLocalDpi xmlns:a14="http://schemas.microsoft.com/office/drawing/2010/main" val="0"/>
+              </a:ext>
+              <a:ext uri="{96DAC541-7B7A-43D3-8B79-37D633B846F1}">
+                <asvg:svgBlip xmlns:asvg="http://schemas.microsoft.com/office/drawing/2016/SVG/main" r:embed="rId35"/>
+              </a:ext>
+            </a:extLst>
+          </a:blip>
+          <a:stretch>
+            <a:fillRect/>
+          </a:stretch>
+        </p:blipFill>
+        <p:spPr>
+          <a:xfrm>
+            <a:off x="6746839" y="5685385"/>
+            <a:ext cx="914400" cy="914400"/>
+          </a:xfrm>
+          <a:prstGeom prst="rect">
+            <a:avLst/>
+          </a:prstGeom>
+        </p:spPr>
+      </p:pic>
+      <p:pic>
+        <p:nvPicPr>
+          <p:cNvPr id="23" name="Graphic 22" descr="Maze with solid fill">
+            <a:extLst>
+              <a:ext uri="{FF2B5EF4-FFF2-40B4-BE49-F238E27FC236}">
+                <a16:creationId xmlns:a16="http://schemas.microsoft.com/office/drawing/2014/main" id="{4FD70DDF-B9B7-E73B-EC4A-48206CFFCCEE}"/>
+              </a:ext>
+            </a:extLst>
+          </p:cNvPr>
+          <p:cNvPicPr>
+            <a:picLocks noChangeAspect="1"/>
+          </p:cNvPicPr>
+          <p:nvPr/>
+        </p:nvPicPr>
+        <p:blipFill>
+          <a:blip r:embed="rId36">
+            <a:extLst>
+              <a:ext uri="{28A0092B-C50C-407E-A947-70E740481C1C}">
+                <a14:useLocalDpi xmlns:a14="http://schemas.microsoft.com/office/drawing/2010/main" val="0"/>
+              </a:ext>
+              <a:ext uri="{96DAC541-7B7A-43D3-8B79-37D633B846F1}">
+                <asvg:svgBlip xmlns:asvg="http://schemas.microsoft.com/office/drawing/2016/SVG/main" r:embed="rId37"/>
+              </a:ext>
+            </a:extLst>
+          </a:blip>
+          <a:stretch>
+            <a:fillRect/>
+          </a:stretch>
+        </p:blipFill>
+        <p:spPr>
+          <a:xfrm>
+            <a:off x="9491625" y="5669293"/>
+            <a:ext cx="914400" cy="914400"/>
+          </a:xfrm>
+          <a:prstGeom prst="rect">
+            <a:avLst/>
+          </a:prstGeom>
+        </p:spPr>
+      </p:pic>
+      <p:pic>
+        <p:nvPicPr>
+          <p:cNvPr id="25" name="Graphic 24" descr="Arrow Right with solid fill">
+            <a:extLst>
+              <a:ext uri="{FF2B5EF4-FFF2-40B4-BE49-F238E27FC236}">
+                <a16:creationId xmlns:a16="http://schemas.microsoft.com/office/drawing/2014/main" id="{9393547B-84B7-AD6D-0F48-0B182CEF7EE4}"/>
+              </a:ext>
+            </a:extLst>
+          </p:cNvPr>
+          <p:cNvPicPr>
+            <a:picLocks noChangeAspect="1"/>
+          </p:cNvPicPr>
+          <p:nvPr/>
+        </p:nvPicPr>
+        <p:blipFill>
+          <a:blip r:embed="rId18">
+            <a:extLst>
+              <a:ext uri="{28A0092B-C50C-407E-A947-70E740481C1C}">
+                <a14:useLocalDpi xmlns:a14="http://schemas.microsoft.com/office/drawing/2010/main" val="0"/>
+              </a:ext>
+              <a:ext uri="{96DAC541-7B7A-43D3-8B79-37D633B846F1}">
+                <asvg:svgBlip xmlns:asvg="http://schemas.microsoft.com/office/drawing/2016/SVG/main" r:embed="rId19"/>
+              </a:ext>
+            </a:extLst>
+          </a:blip>
+          <a:stretch>
+            <a:fillRect/>
+          </a:stretch>
+        </p:blipFill>
+        <p:spPr>
+          <a:xfrm flipH="1">
+            <a:off x="5158564" y="5776295"/>
             <a:ext cx="914400" cy="914400"/>
           </a:xfrm>
           <a:prstGeom prst="rect">
@@ -10571,7 +12082,7 @@
     </p:spTree>
     <p:extLst>
       <p:ext uri="{BB962C8B-B14F-4D97-AF65-F5344CB8AC3E}">
-        <p14:creationId xmlns:p14="http://schemas.microsoft.com/office/powerpoint/2010/main" val="2826373203"/>
+        <p14:creationId xmlns:p14="http://schemas.microsoft.com/office/powerpoint/2010/main" val="1019907473"/>
       </p:ext>
     </p:extLst>
   </p:cSld>
@@ -10629,6 +12140,1598 @@
         <p:spPr>
           <a:xfrm>
             <a:off x="0" y="1"/>
+            <a:ext cx="5815584" cy="655782"/>
+          </a:xfrm>
+        </p:spPr>
+        <p:txBody>
+          <a:bodyPr>
+            <a:normAutofit fontScale="90000"/>
+          </a:bodyPr>
+          <a:lstStyle/>
+          <a:p>
+            <a:r>
+              <a:rPr lang="en-US" dirty="0">
+                <a:solidFill>
+                  <a:schemeClr val="bg1"/>
+                </a:solidFill>
+                <a:latin typeface="Chakra Petch" panose="00000500000000000000" pitchFamily="2" charset="-34"/>
+                <a:cs typeface="Chakra Petch" panose="00000500000000000000" pitchFamily="2" charset="-34"/>
+              </a:rPr>
+              <a:t>Materials and Methods</a:t>
+            </a:r>
+          </a:p>
+        </p:txBody>
+      </p:sp>
+      <p:pic>
+        <p:nvPicPr>
+          <p:cNvPr id="4" name="Graphic 3" descr="Open book outline">
+            <a:extLst>
+              <a:ext uri="{FF2B5EF4-FFF2-40B4-BE49-F238E27FC236}">
+                <a16:creationId xmlns:a16="http://schemas.microsoft.com/office/drawing/2014/main" id="{ECB78824-BC05-9D40-AB4B-26642A05DDE3}"/>
+              </a:ext>
+            </a:extLst>
+          </p:cNvPr>
+          <p:cNvPicPr>
+            <a:picLocks noChangeAspect="1"/>
+          </p:cNvPicPr>
+          <p:nvPr/>
+        </p:nvPicPr>
+        <p:blipFill>
+          <a:blip r:embed="rId2">
+            <a:extLst>
+              <a:ext uri="{28A0092B-C50C-407E-A947-70E740481C1C}">
+                <a14:useLocalDpi xmlns:a14="http://schemas.microsoft.com/office/drawing/2010/main" val="0"/>
+              </a:ext>
+              <a:ext uri="{96DAC541-7B7A-43D3-8B79-37D633B846F1}">
+                <asvg:svgBlip xmlns:asvg="http://schemas.microsoft.com/office/drawing/2016/SVG/main" r:embed="rId3"/>
+              </a:ext>
+            </a:extLst>
+          </a:blip>
+          <a:stretch>
+            <a:fillRect/>
+          </a:stretch>
+        </p:blipFill>
+        <p:spPr>
+          <a:xfrm>
+            <a:off x="1416833" y="2552218"/>
+            <a:ext cx="914400" cy="914400"/>
+          </a:xfrm>
+          <a:prstGeom prst="rect">
+            <a:avLst/>
+          </a:prstGeom>
+        </p:spPr>
+      </p:pic>
+      <p:pic>
+        <p:nvPicPr>
+          <p:cNvPr id="6" name="Graphic 5" descr="Books outline">
+            <a:extLst>
+              <a:ext uri="{FF2B5EF4-FFF2-40B4-BE49-F238E27FC236}">
+                <a16:creationId xmlns:a16="http://schemas.microsoft.com/office/drawing/2014/main" id="{A13BDAF4-913F-E7B5-52C6-DE479410E624}"/>
+              </a:ext>
+            </a:extLst>
+          </p:cNvPr>
+          <p:cNvPicPr>
+            <a:picLocks noChangeAspect="1"/>
+          </p:cNvPicPr>
+          <p:nvPr/>
+        </p:nvPicPr>
+        <p:blipFill>
+          <a:blip r:embed="rId4">
+            <a:extLst>
+              <a:ext uri="{28A0092B-C50C-407E-A947-70E740481C1C}">
+                <a14:useLocalDpi xmlns:a14="http://schemas.microsoft.com/office/drawing/2010/main" val="0"/>
+              </a:ext>
+              <a:ext uri="{96DAC541-7B7A-43D3-8B79-37D633B846F1}">
+                <asvg:svgBlip xmlns:asvg="http://schemas.microsoft.com/office/drawing/2016/SVG/main" r:embed="rId5"/>
+              </a:ext>
+            </a:extLst>
+          </a:blip>
+          <a:stretch>
+            <a:fillRect/>
+          </a:stretch>
+        </p:blipFill>
+        <p:spPr>
+          <a:xfrm>
+            <a:off x="1422892" y="3447568"/>
+            <a:ext cx="914400" cy="914400"/>
+          </a:xfrm>
+          <a:prstGeom prst="rect">
+            <a:avLst/>
+          </a:prstGeom>
+        </p:spPr>
+      </p:pic>
+      <p:pic>
+        <p:nvPicPr>
+          <p:cNvPr id="8" name="Graphic 7" descr="Books on shelf outline">
+            <a:extLst>
+              <a:ext uri="{FF2B5EF4-FFF2-40B4-BE49-F238E27FC236}">
+                <a16:creationId xmlns:a16="http://schemas.microsoft.com/office/drawing/2014/main" id="{88938F05-B6A7-84E9-CAFE-6E6880CA5DA5}"/>
+              </a:ext>
+            </a:extLst>
+          </p:cNvPr>
+          <p:cNvPicPr>
+            <a:picLocks noChangeAspect="1"/>
+          </p:cNvPicPr>
+          <p:nvPr/>
+        </p:nvPicPr>
+        <p:blipFill>
+          <a:blip r:embed="rId6">
+            <a:extLst>
+              <a:ext uri="{28A0092B-C50C-407E-A947-70E740481C1C}">
+                <a14:useLocalDpi xmlns:a14="http://schemas.microsoft.com/office/drawing/2010/main" val="0"/>
+              </a:ext>
+              <a:ext uri="{96DAC541-7B7A-43D3-8B79-37D633B846F1}">
+                <asvg:svgBlip xmlns:asvg="http://schemas.microsoft.com/office/drawing/2016/SVG/main" r:embed="rId7"/>
+              </a:ext>
+            </a:extLst>
+          </a:blip>
+          <a:stretch>
+            <a:fillRect/>
+          </a:stretch>
+        </p:blipFill>
+        <p:spPr>
+          <a:xfrm>
+            <a:off x="2337292" y="3447568"/>
+            <a:ext cx="914400" cy="914400"/>
+          </a:xfrm>
+          <a:prstGeom prst="rect">
+            <a:avLst/>
+          </a:prstGeom>
+        </p:spPr>
+      </p:pic>
+      <p:pic>
+        <p:nvPicPr>
+          <p:cNvPr id="10" name="Graphic 9" descr="Document outline">
+            <a:extLst>
+              <a:ext uri="{FF2B5EF4-FFF2-40B4-BE49-F238E27FC236}">
+                <a16:creationId xmlns:a16="http://schemas.microsoft.com/office/drawing/2014/main" id="{06A67FF4-2404-1E4B-CAAE-34E9A31DFCB3}"/>
+              </a:ext>
+            </a:extLst>
+          </p:cNvPr>
+          <p:cNvPicPr>
+            <a:picLocks noChangeAspect="1"/>
+          </p:cNvPicPr>
+          <p:nvPr/>
+        </p:nvPicPr>
+        <p:blipFill>
+          <a:blip r:embed="rId8">
+            <a:extLst>
+              <a:ext uri="{28A0092B-C50C-407E-A947-70E740481C1C}">
+                <a14:useLocalDpi xmlns:a14="http://schemas.microsoft.com/office/drawing/2010/main" val="0"/>
+              </a:ext>
+              <a:ext uri="{96DAC541-7B7A-43D3-8B79-37D633B846F1}">
+                <asvg:svgBlip xmlns:asvg="http://schemas.microsoft.com/office/drawing/2016/SVG/main" r:embed="rId9"/>
+              </a:ext>
+            </a:extLst>
+          </a:blip>
+          <a:srcRect/>
+          <a:stretch/>
+        </p:blipFill>
+        <p:spPr>
+          <a:xfrm>
+            <a:off x="2331233" y="2552218"/>
+            <a:ext cx="914400" cy="914400"/>
+          </a:xfrm>
+          <a:prstGeom prst="rect">
+            <a:avLst/>
+          </a:prstGeom>
+        </p:spPr>
+      </p:pic>
+      <p:pic>
+        <p:nvPicPr>
+          <p:cNvPr id="14" name="Graphic 13" descr="Web design outline">
+            <a:extLst>
+              <a:ext uri="{FF2B5EF4-FFF2-40B4-BE49-F238E27FC236}">
+                <a16:creationId xmlns:a16="http://schemas.microsoft.com/office/drawing/2014/main" id="{E8463269-00B1-2783-E223-17CADDD78075}"/>
+              </a:ext>
+            </a:extLst>
+          </p:cNvPr>
+          <p:cNvPicPr>
+            <a:picLocks noChangeAspect="1"/>
+          </p:cNvPicPr>
+          <p:nvPr/>
+        </p:nvPicPr>
+        <p:blipFill>
+          <a:blip r:embed="rId10">
+            <a:extLst>
+              <a:ext uri="{28A0092B-C50C-407E-A947-70E740481C1C}">
+                <a14:useLocalDpi xmlns:a14="http://schemas.microsoft.com/office/drawing/2010/main" val="0"/>
+              </a:ext>
+              <a:ext uri="{96DAC541-7B7A-43D3-8B79-37D633B846F1}">
+                <asvg:svgBlip xmlns:asvg="http://schemas.microsoft.com/office/drawing/2016/SVG/main" r:embed="rId11"/>
+              </a:ext>
+            </a:extLst>
+          </a:blip>
+          <a:stretch>
+            <a:fillRect/>
+          </a:stretch>
+        </p:blipFill>
+        <p:spPr>
+          <a:xfrm>
+            <a:off x="6305523" y="2969400"/>
+            <a:ext cx="914400" cy="914400"/>
+          </a:xfrm>
+          <a:prstGeom prst="rect">
+            <a:avLst/>
+          </a:prstGeom>
+        </p:spPr>
+      </p:pic>
+      <p:pic>
+        <p:nvPicPr>
+          <p:cNvPr id="16" name="Graphic 15" descr="Blueprint outline">
+            <a:extLst>
+              <a:ext uri="{FF2B5EF4-FFF2-40B4-BE49-F238E27FC236}">
+                <a16:creationId xmlns:a16="http://schemas.microsoft.com/office/drawing/2014/main" id="{9A7C6BB2-CFE8-486E-6AC6-675F36F79509}"/>
+              </a:ext>
+            </a:extLst>
+          </p:cNvPr>
+          <p:cNvPicPr>
+            <a:picLocks noChangeAspect="1"/>
+          </p:cNvPicPr>
+          <p:nvPr/>
+        </p:nvPicPr>
+        <p:blipFill>
+          <a:blip r:embed="rId12">
+            <a:extLst>
+              <a:ext uri="{28A0092B-C50C-407E-A947-70E740481C1C}">
+                <a14:useLocalDpi xmlns:a14="http://schemas.microsoft.com/office/drawing/2010/main" val="0"/>
+              </a:ext>
+              <a:ext uri="{96DAC541-7B7A-43D3-8B79-37D633B846F1}">
+                <asvg:svgBlip xmlns:asvg="http://schemas.microsoft.com/office/drawing/2016/SVG/main" r:embed="rId13"/>
+              </a:ext>
+            </a:extLst>
+          </a:blip>
+          <a:stretch>
+            <a:fillRect/>
+          </a:stretch>
+        </p:blipFill>
+        <p:spPr>
+          <a:xfrm>
+            <a:off x="4317106" y="2971800"/>
+            <a:ext cx="914400" cy="914400"/>
+          </a:xfrm>
+          <a:prstGeom prst="rect">
+            <a:avLst/>
+          </a:prstGeom>
+        </p:spPr>
+      </p:pic>
+      <p:pic>
+        <p:nvPicPr>
+          <p:cNvPr id="22" name="Graphic 21" descr="Database outline">
+            <a:extLst>
+              <a:ext uri="{FF2B5EF4-FFF2-40B4-BE49-F238E27FC236}">
+                <a16:creationId xmlns:a16="http://schemas.microsoft.com/office/drawing/2014/main" id="{F7387DD6-BA10-DC36-D65B-CA642D35B591}"/>
+              </a:ext>
+            </a:extLst>
+          </p:cNvPr>
+          <p:cNvPicPr>
+            <a:picLocks noChangeAspect="1"/>
+          </p:cNvPicPr>
+          <p:nvPr/>
+        </p:nvPicPr>
+        <p:blipFill>
+          <a:blip r:embed="rId14">
+            <a:extLst>
+              <a:ext uri="{28A0092B-C50C-407E-A947-70E740481C1C}">
+                <a14:useLocalDpi xmlns:a14="http://schemas.microsoft.com/office/drawing/2010/main" val="0"/>
+              </a:ext>
+              <a:ext uri="{96DAC541-7B7A-43D3-8B79-37D633B846F1}">
+                <asvg:svgBlip xmlns:asvg="http://schemas.microsoft.com/office/drawing/2016/SVG/main" r:embed="rId15"/>
+              </a:ext>
+            </a:extLst>
+          </a:blip>
+          <a:stretch>
+            <a:fillRect/>
+          </a:stretch>
+        </p:blipFill>
+        <p:spPr>
+          <a:xfrm>
+            <a:off x="7130123" y="2206542"/>
+            <a:ext cx="914400" cy="914400"/>
+          </a:xfrm>
+          <a:prstGeom prst="rect">
+            <a:avLst/>
+          </a:prstGeom>
+        </p:spPr>
+      </p:pic>
+      <p:pic>
+        <p:nvPicPr>
+          <p:cNvPr id="5" name="Graphic 4" descr="Acquisition with solid fill">
+            <a:extLst>
+              <a:ext uri="{FF2B5EF4-FFF2-40B4-BE49-F238E27FC236}">
+                <a16:creationId xmlns:a16="http://schemas.microsoft.com/office/drawing/2014/main" id="{3AA0AEE4-7C5F-1AE5-0541-972320F9CBEB}"/>
+              </a:ext>
+            </a:extLst>
+          </p:cNvPr>
+          <p:cNvPicPr>
+            <a:picLocks noChangeAspect="1"/>
+          </p:cNvPicPr>
+          <p:nvPr/>
+        </p:nvPicPr>
+        <p:blipFill>
+          <a:blip r:embed="rId16">
+            <a:extLst>
+              <a:ext uri="{28A0092B-C50C-407E-A947-70E740481C1C}">
+                <a14:useLocalDpi xmlns:a14="http://schemas.microsoft.com/office/drawing/2010/main" val="0"/>
+              </a:ext>
+              <a:ext uri="{96DAC541-7B7A-43D3-8B79-37D633B846F1}">
+                <asvg:svgBlip xmlns:asvg="http://schemas.microsoft.com/office/drawing/2016/SVG/main" r:embed="rId17"/>
+              </a:ext>
+            </a:extLst>
+          </a:blip>
+          <a:stretch>
+            <a:fillRect/>
+          </a:stretch>
+        </p:blipFill>
+        <p:spPr>
+          <a:xfrm flipV="1">
+            <a:off x="7206162" y="2901147"/>
+            <a:ext cx="914400" cy="914400"/>
+          </a:xfrm>
+          <a:prstGeom prst="rect">
+            <a:avLst/>
+          </a:prstGeom>
+        </p:spPr>
+      </p:pic>
+      <p:pic>
+        <p:nvPicPr>
+          <p:cNvPr id="9" name="Graphic 8" descr="Arrow Right with solid fill">
+            <a:extLst>
+              <a:ext uri="{FF2B5EF4-FFF2-40B4-BE49-F238E27FC236}">
+                <a16:creationId xmlns:a16="http://schemas.microsoft.com/office/drawing/2014/main" id="{447AA9CC-5D1B-9AE1-6486-2A65075C5B48}"/>
+              </a:ext>
+            </a:extLst>
+          </p:cNvPr>
+          <p:cNvPicPr>
+            <a:picLocks noChangeAspect="1"/>
+          </p:cNvPicPr>
+          <p:nvPr/>
+        </p:nvPicPr>
+        <p:blipFill>
+          <a:blip r:embed="rId18">
+            <a:extLst>
+              <a:ext uri="{28A0092B-C50C-407E-A947-70E740481C1C}">
+                <a14:useLocalDpi xmlns:a14="http://schemas.microsoft.com/office/drawing/2010/main" val="0"/>
+              </a:ext>
+              <a:ext uri="{96DAC541-7B7A-43D3-8B79-37D633B846F1}">
+                <asvg:svgBlip xmlns:asvg="http://schemas.microsoft.com/office/drawing/2016/SVG/main" r:embed="rId19"/>
+              </a:ext>
+            </a:extLst>
+          </a:blip>
+          <a:stretch>
+            <a:fillRect/>
+          </a:stretch>
+        </p:blipFill>
+        <p:spPr>
+          <a:xfrm>
+            <a:off x="8924667" y="2969400"/>
+            <a:ext cx="914400" cy="914400"/>
+          </a:xfrm>
+          <a:prstGeom prst="rect">
+            <a:avLst/>
+          </a:prstGeom>
+        </p:spPr>
+      </p:pic>
+      <p:pic>
+        <p:nvPicPr>
+          <p:cNvPr id="13" name="Graphic 12" descr="Line arrow: Rotate right with solid fill">
+            <a:extLst>
+              <a:ext uri="{FF2B5EF4-FFF2-40B4-BE49-F238E27FC236}">
+                <a16:creationId xmlns:a16="http://schemas.microsoft.com/office/drawing/2014/main" id="{44804FB3-E78C-F1A7-5330-AC1883D473E0}"/>
+              </a:ext>
+            </a:extLst>
+          </p:cNvPr>
+          <p:cNvPicPr>
+            <a:picLocks noChangeAspect="1"/>
+          </p:cNvPicPr>
+          <p:nvPr/>
+        </p:nvPicPr>
+        <p:blipFill>
+          <a:blip r:embed="rId20">
+            <a:extLst>
+              <a:ext uri="{28A0092B-C50C-407E-A947-70E740481C1C}">
+                <a14:useLocalDpi xmlns:a14="http://schemas.microsoft.com/office/drawing/2010/main" val="0"/>
+              </a:ext>
+              <a:ext uri="{96DAC541-7B7A-43D3-8B79-37D633B846F1}">
+                <asvg:svgBlip xmlns:asvg="http://schemas.microsoft.com/office/drawing/2016/SVG/main" r:embed="rId21"/>
+              </a:ext>
+            </a:extLst>
+          </a:blip>
+          <a:stretch>
+            <a:fillRect/>
+          </a:stretch>
+        </p:blipFill>
+        <p:spPr>
+          <a:xfrm rot="13302510">
+            <a:off x="7345764" y="3522836"/>
+            <a:ext cx="914400" cy="914400"/>
+          </a:xfrm>
+          <a:prstGeom prst="rect">
+            <a:avLst/>
+          </a:prstGeom>
+        </p:spPr>
+      </p:pic>
+      <p:pic>
+        <p:nvPicPr>
+          <p:cNvPr id="26" name="Graphic 25" descr="Workflow with solid fill">
+            <a:extLst>
+              <a:ext uri="{FF2B5EF4-FFF2-40B4-BE49-F238E27FC236}">
+                <a16:creationId xmlns:a16="http://schemas.microsoft.com/office/drawing/2014/main" id="{04314610-BCC9-2DD4-0413-0FA5102FF3B5}"/>
+              </a:ext>
+            </a:extLst>
+          </p:cNvPr>
+          <p:cNvPicPr>
+            <a:picLocks noChangeAspect="1"/>
+          </p:cNvPicPr>
+          <p:nvPr/>
+        </p:nvPicPr>
+        <p:blipFill>
+          <a:blip r:embed="rId22">
+            <a:extLst>
+              <a:ext uri="{28A0092B-C50C-407E-A947-70E740481C1C}">
+                <a14:useLocalDpi xmlns:a14="http://schemas.microsoft.com/office/drawing/2010/main" val="0"/>
+              </a:ext>
+              <a:ext uri="{96DAC541-7B7A-43D3-8B79-37D633B846F1}">
+                <asvg:svgBlip xmlns:asvg="http://schemas.microsoft.com/office/drawing/2016/SVG/main" r:embed="rId23"/>
+              </a:ext>
+            </a:extLst>
+          </a:blip>
+          <a:stretch>
+            <a:fillRect/>
+          </a:stretch>
+        </p:blipFill>
+        <p:spPr>
+          <a:xfrm>
+            <a:off x="9858058" y="2969400"/>
+            <a:ext cx="914400" cy="914400"/>
+          </a:xfrm>
+          <a:prstGeom prst="rect">
+            <a:avLst/>
+          </a:prstGeom>
+        </p:spPr>
+      </p:pic>
+      <p:pic>
+        <p:nvPicPr>
+          <p:cNvPr id="27" name="Graphic 26" descr="Arrow Right with solid fill">
+            <a:extLst>
+              <a:ext uri="{FF2B5EF4-FFF2-40B4-BE49-F238E27FC236}">
+                <a16:creationId xmlns:a16="http://schemas.microsoft.com/office/drawing/2014/main" id="{7E3232CE-E992-70D1-FD3C-2EDBA42304AD}"/>
+              </a:ext>
+            </a:extLst>
+          </p:cNvPr>
+          <p:cNvPicPr>
+            <a:picLocks noChangeAspect="1"/>
+          </p:cNvPicPr>
+          <p:nvPr/>
+        </p:nvPicPr>
+        <p:blipFill>
+          <a:blip r:embed="rId18">
+            <a:extLst>
+              <a:ext uri="{28A0092B-C50C-407E-A947-70E740481C1C}">
+                <a14:useLocalDpi xmlns:a14="http://schemas.microsoft.com/office/drawing/2010/main" val="0"/>
+              </a:ext>
+              <a:ext uri="{96DAC541-7B7A-43D3-8B79-37D633B846F1}">
+                <asvg:svgBlip xmlns:asvg="http://schemas.microsoft.com/office/drawing/2016/SVG/main" r:embed="rId19"/>
+              </a:ext>
+            </a:extLst>
+          </a:blip>
+          <a:stretch>
+            <a:fillRect/>
+          </a:stretch>
+        </p:blipFill>
+        <p:spPr>
+          <a:xfrm>
+            <a:off x="5309661" y="2969400"/>
+            <a:ext cx="914400" cy="914400"/>
+          </a:xfrm>
+          <a:prstGeom prst="rect">
+            <a:avLst/>
+          </a:prstGeom>
+        </p:spPr>
+      </p:pic>
+      <p:pic>
+        <p:nvPicPr>
+          <p:cNvPr id="29" name="Graphic 28" descr="Scatterplot with solid fill">
+            <a:extLst>
+              <a:ext uri="{FF2B5EF4-FFF2-40B4-BE49-F238E27FC236}">
+                <a16:creationId xmlns:a16="http://schemas.microsoft.com/office/drawing/2014/main" id="{C2048285-7293-48E1-E144-EB95E952F3E6}"/>
+              </a:ext>
+            </a:extLst>
+          </p:cNvPr>
+          <p:cNvPicPr>
+            <a:picLocks noChangeAspect="1"/>
+          </p:cNvPicPr>
+          <p:nvPr/>
+        </p:nvPicPr>
+        <p:blipFill>
+          <a:blip r:embed="rId24">
+            <a:extLst>
+              <a:ext uri="{28A0092B-C50C-407E-A947-70E740481C1C}">
+                <a14:useLocalDpi xmlns:a14="http://schemas.microsoft.com/office/drawing/2010/main" val="0"/>
+              </a:ext>
+              <a:ext uri="{96DAC541-7B7A-43D3-8B79-37D633B846F1}">
+                <asvg:svgBlip xmlns:asvg="http://schemas.microsoft.com/office/drawing/2016/SVG/main" r:embed="rId25"/>
+              </a:ext>
+            </a:extLst>
+          </a:blip>
+          <a:stretch>
+            <a:fillRect/>
+          </a:stretch>
+        </p:blipFill>
+        <p:spPr>
+          <a:xfrm>
+            <a:off x="8036185" y="2969400"/>
+            <a:ext cx="914400" cy="914400"/>
+          </a:xfrm>
+          <a:prstGeom prst="rect">
+            <a:avLst/>
+          </a:prstGeom>
+        </p:spPr>
+      </p:pic>
+      <p:pic>
+        <p:nvPicPr>
+          <p:cNvPr id="31" name="Graphic 30" descr="Arrow Right with solid fill">
+            <a:extLst>
+              <a:ext uri="{FF2B5EF4-FFF2-40B4-BE49-F238E27FC236}">
+                <a16:creationId xmlns:a16="http://schemas.microsoft.com/office/drawing/2014/main" id="{556F1497-DC9A-FCB0-6D57-EADCC586CD7D}"/>
+              </a:ext>
+            </a:extLst>
+          </p:cNvPr>
+          <p:cNvPicPr>
+            <a:picLocks noChangeAspect="1"/>
+          </p:cNvPicPr>
+          <p:nvPr/>
+        </p:nvPicPr>
+        <p:blipFill>
+          <a:blip r:embed="rId18">
+            <a:extLst>
+              <a:ext uri="{28A0092B-C50C-407E-A947-70E740481C1C}">
+                <a14:useLocalDpi xmlns:a14="http://schemas.microsoft.com/office/drawing/2010/main" val="0"/>
+              </a:ext>
+              <a:ext uri="{96DAC541-7B7A-43D3-8B79-37D633B846F1}">
+                <asvg:svgBlip xmlns:asvg="http://schemas.microsoft.com/office/drawing/2016/SVG/main" r:embed="rId19"/>
+              </a:ext>
+            </a:extLst>
+          </a:blip>
+          <a:stretch>
+            <a:fillRect/>
+          </a:stretch>
+        </p:blipFill>
+        <p:spPr>
+          <a:xfrm>
+            <a:off x="3327095" y="2971800"/>
+            <a:ext cx="914400" cy="914400"/>
+          </a:xfrm>
+          <a:prstGeom prst="rect">
+            <a:avLst/>
+          </a:prstGeom>
+        </p:spPr>
+      </p:pic>
+      <p:pic>
+        <p:nvPicPr>
+          <p:cNvPr id="3" name="Graphic 2" descr="Layers Design outline">
+            <a:extLst>
+              <a:ext uri="{FF2B5EF4-FFF2-40B4-BE49-F238E27FC236}">
+                <a16:creationId xmlns:a16="http://schemas.microsoft.com/office/drawing/2014/main" id="{FD490D8D-4512-36E0-1CAE-C16B359EBE67}"/>
+              </a:ext>
+            </a:extLst>
+          </p:cNvPr>
+          <p:cNvPicPr>
+            <a:picLocks noChangeAspect="1"/>
+          </p:cNvPicPr>
+          <p:nvPr/>
+        </p:nvPicPr>
+        <p:blipFill>
+          <a:blip r:embed="rId26">
+            <a:extLst>
+              <a:ext uri="{28A0092B-C50C-407E-A947-70E740481C1C}">
+                <a14:useLocalDpi xmlns:a14="http://schemas.microsoft.com/office/drawing/2010/main" val="0"/>
+              </a:ext>
+              <a:ext uri="{96DAC541-7B7A-43D3-8B79-37D633B846F1}">
+                <asvg:svgBlip xmlns:asvg="http://schemas.microsoft.com/office/drawing/2016/SVG/main" r:embed="rId27"/>
+              </a:ext>
+            </a:extLst>
+          </a:blip>
+          <a:stretch>
+            <a:fillRect/>
+          </a:stretch>
+        </p:blipFill>
+        <p:spPr>
+          <a:xfrm>
+            <a:off x="8213311" y="5776295"/>
+            <a:ext cx="914400" cy="914400"/>
+          </a:xfrm>
+          <a:prstGeom prst="rect">
+            <a:avLst/>
+          </a:prstGeom>
+        </p:spPr>
+      </p:pic>
+      <p:pic>
+        <p:nvPicPr>
+          <p:cNvPr id="7" name="Graphic 6" descr="Illustrator outline">
+            <a:extLst>
+              <a:ext uri="{FF2B5EF4-FFF2-40B4-BE49-F238E27FC236}">
+                <a16:creationId xmlns:a16="http://schemas.microsoft.com/office/drawing/2014/main" id="{1C08C13A-3809-8254-4BEA-491970B19B47}"/>
+              </a:ext>
+            </a:extLst>
+          </p:cNvPr>
+          <p:cNvPicPr>
+            <a:picLocks noChangeAspect="1"/>
+          </p:cNvPicPr>
+          <p:nvPr/>
+        </p:nvPicPr>
+        <p:blipFill>
+          <a:blip r:embed="rId28">
+            <a:extLst>
+              <a:ext uri="{28A0092B-C50C-407E-A947-70E740481C1C}">
+                <a14:useLocalDpi xmlns:a14="http://schemas.microsoft.com/office/drawing/2010/main" val="0"/>
+              </a:ext>
+              <a:ext uri="{96DAC541-7B7A-43D3-8B79-37D633B846F1}">
+                <asvg:svgBlip xmlns:asvg="http://schemas.microsoft.com/office/drawing/2016/SVG/main" r:embed="rId29"/>
+              </a:ext>
+            </a:extLst>
+          </a:blip>
+          <a:stretch>
+            <a:fillRect/>
+          </a:stretch>
+        </p:blipFill>
+        <p:spPr>
+          <a:xfrm>
+            <a:off x="2244255" y="5669293"/>
+            <a:ext cx="914400" cy="914400"/>
+          </a:xfrm>
+          <a:prstGeom prst="rect">
+            <a:avLst/>
+          </a:prstGeom>
+        </p:spPr>
+      </p:pic>
+      <p:pic>
+        <p:nvPicPr>
+          <p:cNvPr id="11" name="Graphic 10" descr="Table outline">
+            <a:extLst>
+              <a:ext uri="{FF2B5EF4-FFF2-40B4-BE49-F238E27FC236}">
+                <a16:creationId xmlns:a16="http://schemas.microsoft.com/office/drawing/2014/main" id="{6BC91D82-ADE8-0117-5244-D68F2F07D07A}"/>
+              </a:ext>
+            </a:extLst>
+          </p:cNvPr>
+          <p:cNvPicPr>
+            <a:picLocks noChangeAspect="1"/>
+          </p:cNvPicPr>
+          <p:nvPr/>
+        </p:nvPicPr>
+        <p:blipFill>
+          <a:blip r:embed="rId30">
+            <a:extLst>
+              <a:ext uri="{28A0092B-C50C-407E-A947-70E740481C1C}">
+                <a14:useLocalDpi xmlns:a14="http://schemas.microsoft.com/office/drawing/2010/main" val="0"/>
+              </a:ext>
+              <a:ext uri="{96DAC541-7B7A-43D3-8B79-37D633B846F1}">
+                <asvg:svgBlip xmlns:asvg="http://schemas.microsoft.com/office/drawing/2016/SVG/main" r:embed="rId31"/>
+              </a:ext>
+            </a:extLst>
+          </a:blip>
+          <a:stretch>
+            <a:fillRect/>
+          </a:stretch>
+        </p:blipFill>
+        <p:spPr>
+          <a:xfrm>
+            <a:off x="10839375" y="5212093"/>
+            <a:ext cx="914400" cy="914400"/>
+          </a:xfrm>
+          <a:prstGeom prst="rect">
+            <a:avLst/>
+          </a:prstGeom>
+        </p:spPr>
+      </p:pic>
+      <p:pic>
+        <p:nvPicPr>
+          <p:cNvPr id="15" name="Graphic 14" descr="Line arrow: Slight curve with solid fill">
+            <a:extLst>
+              <a:ext uri="{FF2B5EF4-FFF2-40B4-BE49-F238E27FC236}">
+                <a16:creationId xmlns:a16="http://schemas.microsoft.com/office/drawing/2014/main" id="{9EE45F9E-1B34-2306-0BDA-9112318A041A}"/>
+              </a:ext>
+            </a:extLst>
+          </p:cNvPr>
+          <p:cNvPicPr>
+            <a:picLocks noChangeAspect="1"/>
+          </p:cNvPicPr>
+          <p:nvPr/>
+        </p:nvPicPr>
+        <p:blipFill>
+          <a:blip r:embed="rId32">
+            <a:extLst>
+              <a:ext uri="{28A0092B-C50C-407E-A947-70E740481C1C}">
+                <a14:useLocalDpi xmlns:a14="http://schemas.microsoft.com/office/drawing/2010/main" val="0"/>
+              </a:ext>
+              <a:ext uri="{96DAC541-7B7A-43D3-8B79-37D633B846F1}">
+                <asvg:svgBlip xmlns:asvg="http://schemas.microsoft.com/office/drawing/2016/SVG/main" r:embed="rId33"/>
+              </a:ext>
+            </a:extLst>
+          </a:blip>
+          <a:stretch>
+            <a:fillRect/>
+          </a:stretch>
+        </p:blipFill>
+        <p:spPr>
+          <a:xfrm>
+            <a:off x="3616648" y="5776295"/>
+            <a:ext cx="914400" cy="914400"/>
+          </a:xfrm>
+          <a:prstGeom prst="rect">
+            <a:avLst/>
+          </a:prstGeom>
+        </p:spPr>
+      </p:pic>
+      <p:pic>
+        <p:nvPicPr>
+          <p:cNvPr id="19" name="Graphic 18" descr="Line arrow: Horizontal U-turn with solid fill">
+            <a:extLst>
+              <a:ext uri="{FF2B5EF4-FFF2-40B4-BE49-F238E27FC236}">
+                <a16:creationId xmlns:a16="http://schemas.microsoft.com/office/drawing/2014/main" id="{62D7EDB6-1932-44BA-40E8-C60BEA52EFBA}"/>
+              </a:ext>
+            </a:extLst>
+          </p:cNvPr>
+          <p:cNvPicPr>
+            <a:picLocks noChangeAspect="1"/>
+          </p:cNvPicPr>
+          <p:nvPr/>
+        </p:nvPicPr>
+        <p:blipFill>
+          <a:blip r:embed="rId34">
+            <a:extLst>
+              <a:ext uri="{28A0092B-C50C-407E-A947-70E740481C1C}">
+                <a14:useLocalDpi xmlns:a14="http://schemas.microsoft.com/office/drawing/2010/main" val="0"/>
+              </a:ext>
+              <a:ext uri="{96DAC541-7B7A-43D3-8B79-37D633B846F1}">
+                <asvg:svgBlip xmlns:asvg="http://schemas.microsoft.com/office/drawing/2016/SVG/main" r:embed="rId35"/>
+              </a:ext>
+            </a:extLst>
+          </a:blip>
+          <a:stretch>
+            <a:fillRect/>
+          </a:stretch>
+        </p:blipFill>
+        <p:spPr>
+          <a:xfrm>
+            <a:off x="6746839" y="5685385"/>
+            <a:ext cx="914400" cy="914400"/>
+          </a:xfrm>
+          <a:prstGeom prst="rect">
+            <a:avLst/>
+          </a:prstGeom>
+        </p:spPr>
+      </p:pic>
+      <p:pic>
+        <p:nvPicPr>
+          <p:cNvPr id="23" name="Graphic 22" descr="Maze with solid fill">
+            <a:extLst>
+              <a:ext uri="{FF2B5EF4-FFF2-40B4-BE49-F238E27FC236}">
+                <a16:creationId xmlns:a16="http://schemas.microsoft.com/office/drawing/2014/main" id="{4FD70DDF-B9B7-E73B-EC4A-48206CFFCCEE}"/>
+              </a:ext>
+            </a:extLst>
+          </p:cNvPr>
+          <p:cNvPicPr>
+            <a:picLocks noChangeAspect="1"/>
+          </p:cNvPicPr>
+          <p:nvPr/>
+        </p:nvPicPr>
+        <p:blipFill>
+          <a:blip r:embed="rId36">
+            <a:extLst>
+              <a:ext uri="{28A0092B-C50C-407E-A947-70E740481C1C}">
+                <a14:useLocalDpi xmlns:a14="http://schemas.microsoft.com/office/drawing/2010/main" val="0"/>
+              </a:ext>
+              <a:ext uri="{96DAC541-7B7A-43D3-8B79-37D633B846F1}">
+                <asvg:svgBlip xmlns:asvg="http://schemas.microsoft.com/office/drawing/2016/SVG/main" r:embed="rId37"/>
+              </a:ext>
+            </a:extLst>
+          </a:blip>
+          <a:stretch>
+            <a:fillRect/>
+          </a:stretch>
+        </p:blipFill>
+        <p:spPr>
+          <a:xfrm>
+            <a:off x="9491625" y="5669293"/>
+            <a:ext cx="914400" cy="914400"/>
+          </a:xfrm>
+          <a:prstGeom prst="rect">
+            <a:avLst/>
+          </a:prstGeom>
+        </p:spPr>
+      </p:pic>
+      <p:pic>
+        <p:nvPicPr>
+          <p:cNvPr id="25" name="Graphic 24" descr="Arrow Right with solid fill">
+            <a:extLst>
+              <a:ext uri="{FF2B5EF4-FFF2-40B4-BE49-F238E27FC236}">
+                <a16:creationId xmlns:a16="http://schemas.microsoft.com/office/drawing/2014/main" id="{9393547B-84B7-AD6D-0F48-0B182CEF7EE4}"/>
+              </a:ext>
+            </a:extLst>
+          </p:cNvPr>
+          <p:cNvPicPr>
+            <a:picLocks noChangeAspect="1"/>
+          </p:cNvPicPr>
+          <p:nvPr/>
+        </p:nvPicPr>
+        <p:blipFill>
+          <a:blip r:embed="rId18">
+            <a:extLst>
+              <a:ext uri="{28A0092B-C50C-407E-A947-70E740481C1C}">
+                <a14:useLocalDpi xmlns:a14="http://schemas.microsoft.com/office/drawing/2010/main" val="0"/>
+              </a:ext>
+              <a:ext uri="{96DAC541-7B7A-43D3-8B79-37D633B846F1}">
+                <asvg:svgBlip xmlns:asvg="http://schemas.microsoft.com/office/drawing/2016/SVG/main" r:embed="rId19"/>
+              </a:ext>
+            </a:extLst>
+          </a:blip>
+          <a:stretch>
+            <a:fillRect/>
+          </a:stretch>
+        </p:blipFill>
+        <p:spPr>
+          <a:xfrm flipH="1">
+            <a:off x="5158564" y="5776295"/>
+            <a:ext cx="914400" cy="914400"/>
+          </a:xfrm>
+          <a:prstGeom prst="rect">
+            <a:avLst/>
+          </a:prstGeom>
+        </p:spPr>
+      </p:pic>
+    </p:spTree>
+    <p:extLst>
+      <p:ext uri="{BB962C8B-B14F-4D97-AF65-F5344CB8AC3E}">
+        <p14:creationId xmlns:p14="http://schemas.microsoft.com/office/powerpoint/2010/main" val="2346015106"/>
+      </p:ext>
+    </p:extLst>
+  </p:cSld>
+  <p:clrMapOvr>
+    <a:masterClrMapping/>
+  </p:clrMapOvr>
+  <mc:AlternateContent xmlns:mc="http://schemas.openxmlformats.org/markup-compatibility/2006" xmlns:p159="http://schemas.microsoft.com/office/powerpoint/2015/09/main">
+    <mc:Choice Requires="p159">
+      <p:transition xmlns:p14="http://schemas.microsoft.com/office/powerpoint/2010/main" spd="slow" p14:dur="2000">
+        <p159:morph option="byObject"/>
+      </p:transition>
+    </mc:Choice>
+    <mc:Fallback xmlns="">
+      <p:transition spd="slow">
+        <p:fade/>
+      </p:transition>
+    </mc:Fallback>
+  </mc:AlternateContent>
+  <p:timing>
+    <p:tnLst>
+      <p:par>
+        <p:cTn id="1" dur="indefinite" restart="never" nodeType="tmRoot">
+          <p:childTnLst>
+            <p:seq concurrent="1" nextAc="seek">
+              <p:cTn id="2" dur="indefinite" nodeType="mainSeq">
+                <p:childTnLst>
+                  <p:par>
+                    <p:cTn id="3" fill="hold">
+                      <p:stCondLst>
+                        <p:cond delay="indefinite"/>
+                      </p:stCondLst>
+                      <p:childTnLst>
+                        <p:par>
+                          <p:cTn id="4" fill="hold">
+                            <p:stCondLst>
+                              <p:cond delay="0"/>
+                            </p:stCondLst>
+                            <p:childTnLst>
+                              <p:par>
+                                <p:cTn id="5" presetID="10" presetClass="entr" presetSubtype="0" fill="hold" nodeType="clickEffect">
+                                  <p:stCondLst>
+                                    <p:cond delay="0"/>
+                                  </p:stCondLst>
+                                  <p:childTnLst>
+                                    <p:set>
+                                      <p:cBhvr>
+                                        <p:cTn id="6" dur="1" fill="hold">
+                                          <p:stCondLst>
+                                            <p:cond delay="0"/>
+                                          </p:stCondLst>
+                                        </p:cTn>
+                                        <p:tgtEl>
+                                          <p:spTgt spid="4"/>
+                                        </p:tgtEl>
+                                        <p:attrNameLst>
+                                          <p:attrName>style.visibility</p:attrName>
+                                        </p:attrNameLst>
+                                      </p:cBhvr>
+                                      <p:to>
+                                        <p:strVal val="visible"/>
+                                      </p:to>
+                                    </p:set>
+                                    <p:animEffect transition="in" filter="fade">
+                                      <p:cBhvr>
+                                        <p:cTn id="7" dur="500"/>
+                                        <p:tgtEl>
+                                          <p:spTgt spid="4"/>
+                                        </p:tgtEl>
+                                      </p:cBhvr>
+                                    </p:animEffect>
+                                  </p:childTnLst>
+                                </p:cTn>
+                              </p:par>
+                              <p:par>
+                                <p:cTn id="8" presetID="10" presetClass="entr" presetSubtype="0" fill="hold" nodeType="withEffect">
+                                  <p:stCondLst>
+                                    <p:cond delay="0"/>
+                                  </p:stCondLst>
+                                  <p:childTnLst>
+                                    <p:set>
+                                      <p:cBhvr>
+                                        <p:cTn id="9" dur="1" fill="hold">
+                                          <p:stCondLst>
+                                            <p:cond delay="0"/>
+                                          </p:stCondLst>
+                                        </p:cTn>
+                                        <p:tgtEl>
+                                          <p:spTgt spid="6"/>
+                                        </p:tgtEl>
+                                        <p:attrNameLst>
+                                          <p:attrName>style.visibility</p:attrName>
+                                        </p:attrNameLst>
+                                      </p:cBhvr>
+                                      <p:to>
+                                        <p:strVal val="visible"/>
+                                      </p:to>
+                                    </p:set>
+                                    <p:animEffect transition="in" filter="fade">
+                                      <p:cBhvr>
+                                        <p:cTn id="10" dur="500"/>
+                                        <p:tgtEl>
+                                          <p:spTgt spid="6"/>
+                                        </p:tgtEl>
+                                      </p:cBhvr>
+                                    </p:animEffect>
+                                  </p:childTnLst>
+                                </p:cTn>
+                              </p:par>
+                              <p:par>
+                                <p:cTn id="11" presetID="10" presetClass="entr" presetSubtype="0" fill="hold" nodeType="withEffect">
+                                  <p:stCondLst>
+                                    <p:cond delay="0"/>
+                                  </p:stCondLst>
+                                  <p:childTnLst>
+                                    <p:set>
+                                      <p:cBhvr>
+                                        <p:cTn id="12" dur="1" fill="hold">
+                                          <p:stCondLst>
+                                            <p:cond delay="0"/>
+                                          </p:stCondLst>
+                                        </p:cTn>
+                                        <p:tgtEl>
+                                          <p:spTgt spid="8"/>
+                                        </p:tgtEl>
+                                        <p:attrNameLst>
+                                          <p:attrName>style.visibility</p:attrName>
+                                        </p:attrNameLst>
+                                      </p:cBhvr>
+                                      <p:to>
+                                        <p:strVal val="visible"/>
+                                      </p:to>
+                                    </p:set>
+                                    <p:animEffect transition="in" filter="fade">
+                                      <p:cBhvr>
+                                        <p:cTn id="13" dur="500"/>
+                                        <p:tgtEl>
+                                          <p:spTgt spid="8"/>
+                                        </p:tgtEl>
+                                      </p:cBhvr>
+                                    </p:animEffect>
+                                  </p:childTnLst>
+                                </p:cTn>
+                              </p:par>
+                              <p:par>
+                                <p:cTn id="14" presetID="10" presetClass="entr" presetSubtype="0" fill="hold" nodeType="withEffect">
+                                  <p:stCondLst>
+                                    <p:cond delay="0"/>
+                                  </p:stCondLst>
+                                  <p:childTnLst>
+                                    <p:set>
+                                      <p:cBhvr>
+                                        <p:cTn id="15" dur="1" fill="hold">
+                                          <p:stCondLst>
+                                            <p:cond delay="0"/>
+                                          </p:stCondLst>
+                                        </p:cTn>
+                                        <p:tgtEl>
+                                          <p:spTgt spid="10"/>
+                                        </p:tgtEl>
+                                        <p:attrNameLst>
+                                          <p:attrName>style.visibility</p:attrName>
+                                        </p:attrNameLst>
+                                      </p:cBhvr>
+                                      <p:to>
+                                        <p:strVal val="visible"/>
+                                      </p:to>
+                                    </p:set>
+                                    <p:animEffect transition="in" filter="fade">
+                                      <p:cBhvr>
+                                        <p:cTn id="16" dur="500"/>
+                                        <p:tgtEl>
+                                          <p:spTgt spid="10"/>
+                                        </p:tgtEl>
+                                      </p:cBhvr>
+                                    </p:animEffect>
+                                  </p:childTnLst>
+                                </p:cTn>
+                              </p:par>
+                            </p:childTnLst>
+                          </p:cTn>
+                        </p:par>
+                      </p:childTnLst>
+                    </p:cTn>
+                  </p:par>
+                  <p:par>
+                    <p:cTn id="17" fill="hold">
+                      <p:stCondLst>
+                        <p:cond delay="indefinite"/>
+                      </p:stCondLst>
+                      <p:childTnLst>
+                        <p:par>
+                          <p:cTn id="18" fill="hold">
+                            <p:stCondLst>
+                              <p:cond delay="0"/>
+                            </p:stCondLst>
+                            <p:childTnLst>
+                              <p:par>
+                                <p:cTn id="19" presetID="22" presetClass="entr" presetSubtype="8" fill="hold" nodeType="clickEffect">
+                                  <p:stCondLst>
+                                    <p:cond delay="0"/>
+                                  </p:stCondLst>
+                                  <p:childTnLst>
+                                    <p:set>
+                                      <p:cBhvr>
+                                        <p:cTn id="20" dur="1" fill="hold">
+                                          <p:stCondLst>
+                                            <p:cond delay="0"/>
+                                          </p:stCondLst>
+                                        </p:cTn>
+                                        <p:tgtEl>
+                                          <p:spTgt spid="31"/>
+                                        </p:tgtEl>
+                                        <p:attrNameLst>
+                                          <p:attrName>style.visibility</p:attrName>
+                                        </p:attrNameLst>
+                                      </p:cBhvr>
+                                      <p:to>
+                                        <p:strVal val="visible"/>
+                                      </p:to>
+                                    </p:set>
+                                    <p:animEffect transition="in" filter="wipe(left)">
+                                      <p:cBhvr>
+                                        <p:cTn id="21" dur="250"/>
+                                        <p:tgtEl>
+                                          <p:spTgt spid="31"/>
+                                        </p:tgtEl>
+                                      </p:cBhvr>
+                                    </p:animEffect>
+                                  </p:childTnLst>
+                                </p:cTn>
+                              </p:par>
+                            </p:childTnLst>
+                          </p:cTn>
+                        </p:par>
+                        <p:par>
+                          <p:cTn id="22" fill="hold">
+                            <p:stCondLst>
+                              <p:cond delay="250"/>
+                            </p:stCondLst>
+                            <p:childTnLst>
+                              <p:par>
+                                <p:cTn id="23" presetID="10" presetClass="entr" presetSubtype="0" fill="hold" nodeType="afterEffect">
+                                  <p:stCondLst>
+                                    <p:cond delay="0"/>
+                                  </p:stCondLst>
+                                  <p:childTnLst>
+                                    <p:set>
+                                      <p:cBhvr>
+                                        <p:cTn id="24" dur="1" fill="hold">
+                                          <p:stCondLst>
+                                            <p:cond delay="0"/>
+                                          </p:stCondLst>
+                                        </p:cTn>
+                                        <p:tgtEl>
+                                          <p:spTgt spid="16"/>
+                                        </p:tgtEl>
+                                        <p:attrNameLst>
+                                          <p:attrName>style.visibility</p:attrName>
+                                        </p:attrNameLst>
+                                      </p:cBhvr>
+                                      <p:to>
+                                        <p:strVal val="visible"/>
+                                      </p:to>
+                                    </p:set>
+                                    <p:animEffect transition="in" filter="fade">
+                                      <p:cBhvr>
+                                        <p:cTn id="25" dur="500"/>
+                                        <p:tgtEl>
+                                          <p:spTgt spid="16"/>
+                                        </p:tgtEl>
+                                      </p:cBhvr>
+                                    </p:animEffect>
+                                  </p:childTnLst>
+                                </p:cTn>
+                              </p:par>
+                            </p:childTnLst>
+                          </p:cTn>
+                        </p:par>
+                      </p:childTnLst>
+                    </p:cTn>
+                  </p:par>
+                  <p:par>
+                    <p:cTn id="26" fill="hold">
+                      <p:stCondLst>
+                        <p:cond delay="indefinite"/>
+                      </p:stCondLst>
+                      <p:childTnLst>
+                        <p:par>
+                          <p:cTn id="27" fill="hold">
+                            <p:stCondLst>
+                              <p:cond delay="0"/>
+                            </p:stCondLst>
+                            <p:childTnLst>
+                              <p:par>
+                                <p:cTn id="28" presetID="22" presetClass="entr" presetSubtype="8" fill="hold" nodeType="clickEffect">
+                                  <p:stCondLst>
+                                    <p:cond delay="0"/>
+                                  </p:stCondLst>
+                                  <p:childTnLst>
+                                    <p:set>
+                                      <p:cBhvr>
+                                        <p:cTn id="29" dur="1" fill="hold">
+                                          <p:stCondLst>
+                                            <p:cond delay="0"/>
+                                          </p:stCondLst>
+                                        </p:cTn>
+                                        <p:tgtEl>
+                                          <p:spTgt spid="27"/>
+                                        </p:tgtEl>
+                                        <p:attrNameLst>
+                                          <p:attrName>style.visibility</p:attrName>
+                                        </p:attrNameLst>
+                                      </p:cBhvr>
+                                      <p:to>
+                                        <p:strVal val="visible"/>
+                                      </p:to>
+                                    </p:set>
+                                    <p:animEffect transition="in" filter="wipe(left)">
+                                      <p:cBhvr>
+                                        <p:cTn id="30" dur="250"/>
+                                        <p:tgtEl>
+                                          <p:spTgt spid="27"/>
+                                        </p:tgtEl>
+                                      </p:cBhvr>
+                                    </p:animEffect>
+                                  </p:childTnLst>
+                                </p:cTn>
+                              </p:par>
+                            </p:childTnLst>
+                          </p:cTn>
+                        </p:par>
+                        <p:par>
+                          <p:cTn id="31" fill="hold">
+                            <p:stCondLst>
+                              <p:cond delay="250"/>
+                            </p:stCondLst>
+                            <p:childTnLst>
+                              <p:par>
+                                <p:cTn id="32" presetID="10" presetClass="entr" presetSubtype="0" fill="hold" nodeType="afterEffect">
+                                  <p:stCondLst>
+                                    <p:cond delay="0"/>
+                                  </p:stCondLst>
+                                  <p:childTnLst>
+                                    <p:set>
+                                      <p:cBhvr>
+                                        <p:cTn id="33" dur="1" fill="hold">
+                                          <p:stCondLst>
+                                            <p:cond delay="0"/>
+                                          </p:stCondLst>
+                                        </p:cTn>
+                                        <p:tgtEl>
+                                          <p:spTgt spid="14"/>
+                                        </p:tgtEl>
+                                        <p:attrNameLst>
+                                          <p:attrName>style.visibility</p:attrName>
+                                        </p:attrNameLst>
+                                      </p:cBhvr>
+                                      <p:to>
+                                        <p:strVal val="visible"/>
+                                      </p:to>
+                                    </p:set>
+                                    <p:animEffect transition="in" filter="fade">
+                                      <p:cBhvr>
+                                        <p:cTn id="34" dur="500"/>
+                                        <p:tgtEl>
+                                          <p:spTgt spid="14"/>
+                                        </p:tgtEl>
+                                      </p:cBhvr>
+                                    </p:animEffect>
+                                  </p:childTnLst>
+                                </p:cTn>
+                              </p:par>
+                            </p:childTnLst>
+                          </p:cTn>
+                        </p:par>
+                      </p:childTnLst>
+                    </p:cTn>
+                  </p:par>
+                  <p:par>
+                    <p:cTn id="35" fill="hold">
+                      <p:stCondLst>
+                        <p:cond delay="indefinite"/>
+                      </p:stCondLst>
+                      <p:childTnLst>
+                        <p:par>
+                          <p:cTn id="36" fill="hold">
+                            <p:stCondLst>
+                              <p:cond delay="0"/>
+                            </p:stCondLst>
+                            <p:childTnLst>
+                              <p:par>
+                                <p:cTn id="37" presetID="10" presetClass="entr" presetSubtype="0" fill="hold" nodeType="clickEffect">
+                                  <p:stCondLst>
+                                    <p:cond delay="0"/>
+                                  </p:stCondLst>
+                                  <p:childTnLst>
+                                    <p:set>
+                                      <p:cBhvr>
+                                        <p:cTn id="38" dur="1" fill="hold">
+                                          <p:stCondLst>
+                                            <p:cond delay="0"/>
+                                          </p:stCondLst>
+                                        </p:cTn>
+                                        <p:tgtEl>
+                                          <p:spTgt spid="22"/>
+                                        </p:tgtEl>
+                                        <p:attrNameLst>
+                                          <p:attrName>style.visibility</p:attrName>
+                                        </p:attrNameLst>
+                                      </p:cBhvr>
+                                      <p:to>
+                                        <p:strVal val="visible"/>
+                                      </p:to>
+                                    </p:set>
+                                    <p:animEffect transition="in" filter="fade">
+                                      <p:cBhvr>
+                                        <p:cTn id="39" dur="500"/>
+                                        <p:tgtEl>
+                                          <p:spTgt spid="22"/>
+                                        </p:tgtEl>
+                                      </p:cBhvr>
+                                    </p:animEffect>
+                                  </p:childTnLst>
+                                </p:cTn>
+                              </p:par>
+                            </p:childTnLst>
+                          </p:cTn>
+                        </p:par>
+                      </p:childTnLst>
+                    </p:cTn>
+                  </p:par>
+                  <p:par>
+                    <p:cTn id="40" fill="hold">
+                      <p:stCondLst>
+                        <p:cond delay="indefinite"/>
+                      </p:stCondLst>
+                      <p:childTnLst>
+                        <p:par>
+                          <p:cTn id="41" fill="hold">
+                            <p:stCondLst>
+                              <p:cond delay="0"/>
+                            </p:stCondLst>
+                            <p:childTnLst>
+                              <p:par>
+                                <p:cTn id="42" presetID="22" presetClass="entr" presetSubtype="8" fill="hold" nodeType="clickEffect">
+                                  <p:stCondLst>
+                                    <p:cond delay="0"/>
+                                  </p:stCondLst>
+                                  <p:childTnLst>
+                                    <p:set>
+                                      <p:cBhvr>
+                                        <p:cTn id="43" dur="1" fill="hold">
+                                          <p:stCondLst>
+                                            <p:cond delay="0"/>
+                                          </p:stCondLst>
+                                        </p:cTn>
+                                        <p:tgtEl>
+                                          <p:spTgt spid="5"/>
+                                        </p:tgtEl>
+                                        <p:attrNameLst>
+                                          <p:attrName>style.visibility</p:attrName>
+                                        </p:attrNameLst>
+                                      </p:cBhvr>
+                                      <p:to>
+                                        <p:strVal val="visible"/>
+                                      </p:to>
+                                    </p:set>
+                                    <p:animEffect transition="in" filter="wipe(left)">
+                                      <p:cBhvr>
+                                        <p:cTn id="44" dur="250"/>
+                                        <p:tgtEl>
+                                          <p:spTgt spid="5"/>
+                                        </p:tgtEl>
+                                      </p:cBhvr>
+                                    </p:animEffect>
+                                  </p:childTnLst>
+                                </p:cTn>
+                              </p:par>
+                            </p:childTnLst>
+                          </p:cTn>
+                        </p:par>
+                        <p:par>
+                          <p:cTn id="45" fill="hold">
+                            <p:stCondLst>
+                              <p:cond delay="250"/>
+                            </p:stCondLst>
+                            <p:childTnLst>
+                              <p:par>
+                                <p:cTn id="46" presetID="10" presetClass="entr" presetSubtype="0" fill="hold" nodeType="afterEffect">
+                                  <p:stCondLst>
+                                    <p:cond delay="0"/>
+                                  </p:stCondLst>
+                                  <p:childTnLst>
+                                    <p:set>
+                                      <p:cBhvr>
+                                        <p:cTn id="47" dur="1" fill="hold">
+                                          <p:stCondLst>
+                                            <p:cond delay="0"/>
+                                          </p:stCondLst>
+                                        </p:cTn>
+                                        <p:tgtEl>
+                                          <p:spTgt spid="29"/>
+                                        </p:tgtEl>
+                                        <p:attrNameLst>
+                                          <p:attrName>style.visibility</p:attrName>
+                                        </p:attrNameLst>
+                                      </p:cBhvr>
+                                      <p:to>
+                                        <p:strVal val="visible"/>
+                                      </p:to>
+                                    </p:set>
+                                    <p:animEffect transition="in" filter="fade">
+                                      <p:cBhvr>
+                                        <p:cTn id="48" dur="500"/>
+                                        <p:tgtEl>
+                                          <p:spTgt spid="29"/>
+                                        </p:tgtEl>
+                                      </p:cBhvr>
+                                    </p:animEffect>
+                                  </p:childTnLst>
+                                </p:cTn>
+                              </p:par>
+                            </p:childTnLst>
+                          </p:cTn>
+                        </p:par>
+                      </p:childTnLst>
+                    </p:cTn>
+                  </p:par>
+                  <p:par>
+                    <p:cTn id="49" fill="hold">
+                      <p:stCondLst>
+                        <p:cond delay="indefinite"/>
+                      </p:stCondLst>
+                      <p:childTnLst>
+                        <p:par>
+                          <p:cTn id="50" fill="hold">
+                            <p:stCondLst>
+                              <p:cond delay="0"/>
+                            </p:stCondLst>
+                            <p:childTnLst>
+                              <p:par>
+                                <p:cTn id="51" presetID="21" presetClass="entr" presetSubtype="1" fill="hold" nodeType="clickEffect">
+                                  <p:stCondLst>
+                                    <p:cond delay="0"/>
+                                  </p:stCondLst>
+                                  <p:childTnLst>
+                                    <p:set>
+                                      <p:cBhvr>
+                                        <p:cTn id="52" dur="1" fill="hold">
+                                          <p:stCondLst>
+                                            <p:cond delay="0"/>
+                                          </p:stCondLst>
+                                        </p:cTn>
+                                        <p:tgtEl>
+                                          <p:spTgt spid="13"/>
+                                        </p:tgtEl>
+                                        <p:attrNameLst>
+                                          <p:attrName>style.visibility</p:attrName>
+                                        </p:attrNameLst>
+                                      </p:cBhvr>
+                                      <p:to>
+                                        <p:strVal val="visible"/>
+                                      </p:to>
+                                    </p:set>
+                                    <p:animEffect transition="in" filter="wheel(1)">
+                                      <p:cBhvr>
+                                        <p:cTn id="53" dur="500"/>
+                                        <p:tgtEl>
+                                          <p:spTgt spid="13"/>
+                                        </p:tgtEl>
+                                      </p:cBhvr>
+                                    </p:animEffect>
+                                  </p:childTnLst>
+                                </p:cTn>
+                              </p:par>
+                            </p:childTnLst>
+                          </p:cTn>
+                        </p:par>
+                      </p:childTnLst>
+                    </p:cTn>
+                  </p:par>
+                  <p:par>
+                    <p:cTn id="54" fill="hold">
+                      <p:stCondLst>
+                        <p:cond delay="indefinite"/>
+                      </p:stCondLst>
+                      <p:childTnLst>
+                        <p:par>
+                          <p:cTn id="55" fill="hold">
+                            <p:stCondLst>
+                              <p:cond delay="0"/>
+                            </p:stCondLst>
+                            <p:childTnLst>
+                              <p:par>
+                                <p:cTn id="56" presetID="22" presetClass="entr" presetSubtype="8" fill="hold" nodeType="clickEffect">
+                                  <p:stCondLst>
+                                    <p:cond delay="0"/>
+                                  </p:stCondLst>
+                                  <p:childTnLst>
+                                    <p:set>
+                                      <p:cBhvr>
+                                        <p:cTn id="57" dur="1" fill="hold">
+                                          <p:stCondLst>
+                                            <p:cond delay="0"/>
+                                          </p:stCondLst>
+                                        </p:cTn>
+                                        <p:tgtEl>
+                                          <p:spTgt spid="9"/>
+                                        </p:tgtEl>
+                                        <p:attrNameLst>
+                                          <p:attrName>style.visibility</p:attrName>
+                                        </p:attrNameLst>
+                                      </p:cBhvr>
+                                      <p:to>
+                                        <p:strVal val="visible"/>
+                                      </p:to>
+                                    </p:set>
+                                    <p:animEffect transition="in" filter="wipe(left)">
+                                      <p:cBhvr>
+                                        <p:cTn id="58" dur="250"/>
+                                        <p:tgtEl>
+                                          <p:spTgt spid="9"/>
+                                        </p:tgtEl>
+                                      </p:cBhvr>
+                                    </p:animEffect>
+                                  </p:childTnLst>
+                                </p:cTn>
+                              </p:par>
+                            </p:childTnLst>
+                          </p:cTn>
+                        </p:par>
+                      </p:childTnLst>
+                    </p:cTn>
+                  </p:par>
+                  <p:par>
+                    <p:cTn id="59" fill="hold">
+                      <p:stCondLst>
+                        <p:cond delay="indefinite"/>
+                      </p:stCondLst>
+                      <p:childTnLst>
+                        <p:par>
+                          <p:cTn id="60" fill="hold">
+                            <p:stCondLst>
+                              <p:cond delay="0"/>
+                            </p:stCondLst>
+                            <p:childTnLst>
+                              <p:par>
+                                <p:cTn id="61" presetID="10" presetClass="entr" presetSubtype="0" fill="hold" nodeType="clickEffect">
+                                  <p:stCondLst>
+                                    <p:cond delay="0"/>
+                                  </p:stCondLst>
+                                  <p:childTnLst>
+                                    <p:set>
+                                      <p:cBhvr>
+                                        <p:cTn id="62" dur="1" fill="hold">
+                                          <p:stCondLst>
+                                            <p:cond delay="0"/>
+                                          </p:stCondLst>
+                                        </p:cTn>
+                                        <p:tgtEl>
+                                          <p:spTgt spid="26"/>
+                                        </p:tgtEl>
+                                        <p:attrNameLst>
+                                          <p:attrName>style.visibility</p:attrName>
+                                        </p:attrNameLst>
+                                      </p:cBhvr>
+                                      <p:to>
+                                        <p:strVal val="visible"/>
+                                      </p:to>
+                                    </p:set>
+                                    <p:animEffect transition="in" filter="fade">
+                                      <p:cBhvr>
+                                        <p:cTn id="63" dur="500"/>
+                                        <p:tgtEl>
+                                          <p:spTgt spid="26"/>
+                                        </p:tgtEl>
+                                      </p:cBhvr>
+                                    </p:animEffect>
+                                  </p:childTnLst>
+                                </p:cTn>
+                              </p:par>
+                            </p:childTnLst>
+                          </p:cTn>
+                        </p:par>
+                      </p:childTnLst>
+                    </p:cTn>
+                  </p:par>
+                </p:childTnLst>
+              </p:cTn>
+              <p:prevCondLst>
+                <p:cond evt="onPrev" delay="0">
+                  <p:tgtEl>
+                    <p:sldTgt/>
+                  </p:tgtEl>
+                </p:cond>
+              </p:prevCondLst>
+              <p:nextCondLst>
+                <p:cond evt="onNext" delay="0">
+                  <p:tgtEl>
+                    <p:sldTgt/>
+                  </p:tgtEl>
+                </p:cond>
+              </p:nextCondLst>
+            </p:seq>
+          </p:childTnLst>
+        </p:cTn>
+      </p:par>
+    </p:tnLst>
+  </p:timing>
+</p:sld>
+</file>
+
+<file path=ppt/slides/slide16.xml><?xml version="1.0" encoding="utf-8"?>
+<p:sld xmlns:a="http://schemas.openxmlformats.org/drawingml/2006/main" xmlns:r="http://schemas.openxmlformats.org/officeDocument/2006/relationships" xmlns:p="http://schemas.openxmlformats.org/presentationml/2006/main">
+  <p:cSld>
+    <p:spTree>
+      <p:nvGrpSpPr>
+        <p:cNvPr id="1" name=""/>
+        <p:cNvGrpSpPr/>
+        <p:nvPr/>
+      </p:nvGrpSpPr>
+      <p:grpSpPr>
+        <a:xfrm>
+          <a:off x="0" y="0"/>
+          <a:ext cx="0" cy="0"/>
+          <a:chOff x="0" y="0"/>
+          <a:chExt cx="0" cy="0"/>
+        </a:xfrm>
+      </p:grpSpPr>
+      <p:sp>
+        <p:nvSpPr>
+          <p:cNvPr id="2" name="Title 1">
+            <a:extLst>
+              <a:ext uri="{FF2B5EF4-FFF2-40B4-BE49-F238E27FC236}">
+                <a16:creationId xmlns:a16="http://schemas.microsoft.com/office/drawing/2014/main" id="{DD8AFD1F-4834-69DC-9339-DFE22FD93B7A}"/>
+              </a:ext>
+            </a:extLst>
+          </p:cNvPr>
+          <p:cNvSpPr>
+            <a:spLocks noGrp="1"/>
+          </p:cNvSpPr>
+          <p:nvPr>
+            <p:ph type="title"/>
+          </p:nvPr>
+        </p:nvSpPr>
+        <p:spPr>
+          <a:xfrm>
+            <a:off x="0" y="1"/>
             <a:ext cx="3140364" cy="655782"/>
           </a:xfrm>
         </p:spPr>
@@ -10712,7 +13815,7 @@
 </p:sld>
 </file>
 
-<file path=ppt/slides/slide16.xml><?xml version="1.0" encoding="utf-8"?>
+<file path=ppt/slides/slide17.xml><?xml version="1.0" encoding="utf-8"?>
 <p:sld xmlns:a="http://schemas.openxmlformats.org/drawingml/2006/main" xmlns:r="http://schemas.openxmlformats.org/officeDocument/2006/relationships" xmlns:p="http://schemas.openxmlformats.org/presentationml/2006/main">
   <p:cSld>
     <p:spTree>
@@ -10892,7 +13995,7 @@
 </p:sld>
 </file>
 
-<file path=ppt/slides/slide17.xml><?xml version="1.0" encoding="utf-8"?>
+<file path=ppt/slides/slide18.xml><?xml version="1.0" encoding="utf-8"?>
 <p:sld xmlns:a="http://schemas.openxmlformats.org/drawingml/2006/main" xmlns:r="http://schemas.openxmlformats.org/officeDocument/2006/relationships" xmlns:p="http://schemas.openxmlformats.org/presentationml/2006/main">
   <p:cSld>
     <p:spTree>

</xml_diff>